<commit_message>
Update Second Oral Presentation.pptx
</commit_message>
<xml_diff>
--- a/Reviews/second review/Second Oral Presentation.pptx
+++ b/Reviews/second review/Second Oral Presentation.pptx
@@ -5,7 +5,7 @@
     <p:sldMasterId id="2147483684" r:id="rId1"/>
   </p:sldMasterIdLst>
   <p:notesMasterIdLst>
-    <p:notesMasterId r:id="rId15"/>
+    <p:notesMasterId r:id="rId17"/>
   </p:notesMasterIdLst>
   <p:sldIdLst>
     <p:sldId id="263" r:id="rId2"/>
@@ -14,13 +14,15 @@
     <p:sldId id="264" r:id="rId5"/>
     <p:sldId id="292" r:id="rId6"/>
     <p:sldId id="301" r:id="rId7"/>
-    <p:sldId id="302" r:id="rId8"/>
-    <p:sldId id="303" r:id="rId9"/>
-    <p:sldId id="294" r:id="rId10"/>
-    <p:sldId id="297" r:id="rId11"/>
-    <p:sldId id="261" r:id="rId12"/>
-    <p:sldId id="304" r:id="rId13"/>
-    <p:sldId id="298" r:id="rId14"/>
+    <p:sldId id="305" r:id="rId8"/>
+    <p:sldId id="306" r:id="rId9"/>
+    <p:sldId id="302" r:id="rId10"/>
+    <p:sldId id="303" r:id="rId11"/>
+    <p:sldId id="294" r:id="rId12"/>
+    <p:sldId id="297" r:id="rId13"/>
+    <p:sldId id="261" r:id="rId14"/>
+    <p:sldId id="304" r:id="rId15"/>
+    <p:sldId id="298" r:id="rId16"/>
   </p:sldIdLst>
   <p:sldSz cx="12192000" cy="6858000"/>
   <p:notesSz cx="6858000" cy="9144000"/>
@@ -121,7 +123,7 @@
   </p:defaultTextStyle>
   <p:extLst>
     <p:ext uri="{EFAFB233-063F-42B5-8137-9DF3F51BA10A}">
-      <p15:sldGuideLst xmlns:p15="http://schemas.microsoft.com/office/powerpoint/2012/main" xmlns="">
+      <p15:sldGuideLst xmlns="" xmlns:p15="http://schemas.microsoft.com/office/powerpoint/2012/main">
         <p15:guide id="1" orient="horz" pos="2160">
           <p15:clr>
             <a:srgbClr val="A4A3A4"/>
@@ -749,7 +751,7 @@
     </p:spTree>
     <p:extLst>
       <p:ext uri="{BB962C8B-B14F-4D97-AF65-F5344CB8AC3E}">
-        <p14:creationId xmlns:p14="http://schemas.microsoft.com/office/powerpoint/2010/main" xmlns="" val="1535185195"/>
+        <p14:creationId xmlns="" xmlns:p14="http://schemas.microsoft.com/office/powerpoint/2010/main" val="1535185195"/>
       </p:ext>
     </p:extLst>
   </p:cSld>
@@ -1034,7 +1036,7 @@
     </p:spTree>
     <p:extLst>
       <p:ext uri="{BB962C8B-B14F-4D97-AF65-F5344CB8AC3E}">
-        <p14:creationId xmlns:p14="http://schemas.microsoft.com/office/powerpoint/2010/main" xmlns="" val="1252035544"/>
+        <p14:creationId xmlns="" xmlns:p14="http://schemas.microsoft.com/office/powerpoint/2010/main" val="1252035544"/>
       </p:ext>
     </p:extLst>
   </p:cSld>
@@ -1207,7 +1209,7 @@
     </p:spTree>
     <p:extLst>
       <p:ext uri="{BB962C8B-B14F-4D97-AF65-F5344CB8AC3E}">
-        <p14:creationId xmlns:p14="http://schemas.microsoft.com/office/powerpoint/2010/main" xmlns="" val="2762954207"/>
+        <p14:creationId xmlns="" xmlns:p14="http://schemas.microsoft.com/office/powerpoint/2010/main" val="2762954207"/>
       </p:ext>
     </p:extLst>
   </p:cSld>
@@ -1390,7 +1392,7 @@
     </p:spTree>
     <p:extLst>
       <p:ext uri="{BB962C8B-B14F-4D97-AF65-F5344CB8AC3E}">
-        <p14:creationId xmlns:p14="http://schemas.microsoft.com/office/powerpoint/2010/main" xmlns="" val="4184834705"/>
+        <p14:creationId xmlns="" xmlns:p14="http://schemas.microsoft.com/office/powerpoint/2010/main" val="4184834705"/>
       </p:ext>
     </p:extLst>
   </p:cSld>
@@ -1563,7 +1565,7 @@
     </p:spTree>
     <p:extLst>
       <p:ext uri="{BB962C8B-B14F-4D97-AF65-F5344CB8AC3E}">
-        <p14:creationId xmlns:p14="http://schemas.microsoft.com/office/powerpoint/2010/main" xmlns="" val="3146986748"/>
+        <p14:creationId xmlns="" xmlns:p14="http://schemas.microsoft.com/office/powerpoint/2010/main" val="3146986748"/>
       </p:ext>
     </p:extLst>
   </p:cSld>
@@ -1813,7 +1815,7 @@
     </p:spTree>
     <p:extLst>
       <p:ext uri="{BB962C8B-B14F-4D97-AF65-F5344CB8AC3E}">
-        <p14:creationId xmlns:p14="http://schemas.microsoft.com/office/powerpoint/2010/main" xmlns="" val="921976296"/>
+        <p14:creationId xmlns="" xmlns:p14="http://schemas.microsoft.com/office/powerpoint/2010/main" val="921976296"/>
       </p:ext>
     </p:extLst>
   </p:cSld>
@@ -2047,7 +2049,7 @@
     </p:spTree>
     <p:extLst>
       <p:ext uri="{BB962C8B-B14F-4D97-AF65-F5344CB8AC3E}">
-        <p14:creationId xmlns:p14="http://schemas.microsoft.com/office/powerpoint/2010/main" xmlns="" val="674776688"/>
+        <p14:creationId xmlns="" xmlns:p14="http://schemas.microsoft.com/office/powerpoint/2010/main" val="674776688"/>
       </p:ext>
     </p:extLst>
   </p:cSld>
@@ -2416,7 +2418,7 @@
     </p:spTree>
     <p:extLst>
       <p:ext uri="{BB962C8B-B14F-4D97-AF65-F5344CB8AC3E}">
-        <p14:creationId xmlns:p14="http://schemas.microsoft.com/office/powerpoint/2010/main" xmlns="" val="967121709"/>
+        <p14:creationId xmlns="" xmlns:p14="http://schemas.microsoft.com/office/powerpoint/2010/main" val="967121709"/>
       </p:ext>
     </p:extLst>
   </p:cSld>
@@ -2538,7 +2540,7 @@
     </p:spTree>
     <p:extLst>
       <p:ext uri="{BB962C8B-B14F-4D97-AF65-F5344CB8AC3E}">
-        <p14:creationId xmlns:p14="http://schemas.microsoft.com/office/powerpoint/2010/main" xmlns="" val="656162686"/>
+        <p14:creationId xmlns="" xmlns:p14="http://schemas.microsoft.com/office/powerpoint/2010/main" val="656162686"/>
       </p:ext>
     </p:extLst>
   </p:cSld>
@@ -2638,7 +2640,7 @@
     </p:spTree>
     <p:extLst>
       <p:ext uri="{BB962C8B-B14F-4D97-AF65-F5344CB8AC3E}">
-        <p14:creationId xmlns:p14="http://schemas.microsoft.com/office/powerpoint/2010/main" xmlns="" val="3133424761"/>
+        <p14:creationId xmlns="" xmlns:p14="http://schemas.microsoft.com/office/powerpoint/2010/main" val="3133424761"/>
       </p:ext>
     </p:extLst>
   </p:cSld>
@@ -2918,7 +2920,7 @@
     </p:spTree>
     <p:extLst>
       <p:ext uri="{BB962C8B-B14F-4D97-AF65-F5344CB8AC3E}">
-        <p14:creationId xmlns:p14="http://schemas.microsoft.com/office/powerpoint/2010/main" xmlns="" val="3468320446"/>
+        <p14:creationId xmlns="" xmlns:p14="http://schemas.microsoft.com/office/powerpoint/2010/main" val="3468320446"/>
       </p:ext>
     </p:extLst>
   </p:cSld>
@@ -3178,7 +3180,7 @@
     </p:spTree>
     <p:extLst>
       <p:ext uri="{BB962C8B-B14F-4D97-AF65-F5344CB8AC3E}">
-        <p14:creationId xmlns:p14="http://schemas.microsoft.com/office/powerpoint/2010/main" xmlns="" val="1482800273"/>
+        <p14:creationId xmlns="" xmlns:p14="http://schemas.microsoft.com/office/powerpoint/2010/main" val="1482800273"/>
       </p:ext>
     </p:extLst>
   </p:cSld>
@@ -3433,7 +3435,7 @@
     </p:spTree>
     <p:extLst>
       <p:ext uri="{BB962C8B-B14F-4D97-AF65-F5344CB8AC3E}">
-        <p14:creationId xmlns:p14="http://schemas.microsoft.com/office/powerpoint/2010/main" xmlns="" val="2766900715"/>
+        <p14:creationId xmlns="" xmlns:p14="http://schemas.microsoft.com/office/powerpoint/2010/main" val="2766900715"/>
       </p:ext>
     </p:extLst>
   </p:cSld>
@@ -3757,7 +3759,7 @@
           <p:cNvPr id="5" name="Rectangle 4">
             <a:extLst>
               <a:ext uri="{FF2B5EF4-FFF2-40B4-BE49-F238E27FC236}">
-                <a16:creationId xmlns:a16="http://schemas.microsoft.com/office/drawing/2014/main" xmlns="" id="{C409AC58-2162-4EEC-B138-250DBBF30288}"/>
+                <a16:creationId xmlns="" xmlns:a16="http://schemas.microsoft.com/office/drawing/2014/main" id="{C409AC58-2162-4EEC-B138-250DBBF30288}"/>
               </a:ext>
             </a:extLst>
           </p:cNvPr>
@@ -3798,7 +3800,37 @@
                 <a:latin typeface="Times New Roman" panose="02020603050405020304" pitchFamily="18" charset="0"/>
                 <a:cs typeface="Times New Roman" panose="02020603050405020304" pitchFamily="18" charset="0"/>
               </a:rPr>
-              <a:t>Project First Review on</a:t>
+              <a:t>Project </a:t>
+            </a:r>
+            <a:r>
+              <a:rPr lang="en-US" dirty="0" smtClean="0">
+                <a:solidFill>
+                  <a:prstClr val="black"/>
+                </a:solidFill>
+                <a:latin typeface="Times New Roman" panose="02020603050405020304" pitchFamily="18" charset="0"/>
+                <a:cs typeface="Times New Roman" panose="02020603050405020304" pitchFamily="18" charset="0"/>
+              </a:rPr>
+              <a:t>Second</a:t>
+            </a:r>
+            <a:r>
+              <a:rPr lang="en-US" dirty="0" smtClean="0">
+                <a:solidFill>
+                  <a:prstClr val="black"/>
+                </a:solidFill>
+                <a:latin typeface="Times New Roman" panose="02020603050405020304" pitchFamily="18" charset="0"/>
+                <a:cs typeface="Times New Roman" panose="02020603050405020304" pitchFamily="18" charset="0"/>
+              </a:rPr>
+              <a:t> </a:t>
+            </a:r>
+            <a:r>
+              <a:rPr lang="en-US" dirty="0">
+                <a:solidFill>
+                  <a:prstClr val="black"/>
+                </a:solidFill>
+                <a:latin typeface="Times New Roman" panose="02020603050405020304" pitchFamily="18" charset="0"/>
+                <a:cs typeface="Times New Roman" panose="02020603050405020304" pitchFamily="18" charset="0"/>
+              </a:rPr>
+              <a:t>Review on</a:t>
             </a:r>
           </a:p>
           <a:p>
@@ -4092,7 +4124,7 @@
           <a:blip r:embed="rId2" cstate="print">
             <a:extLst>
               <a:ext uri="{28A0092B-C50C-407E-A947-70E740481C1C}">
-                <a14:useLocalDpi xmlns:a14="http://schemas.microsoft.com/office/drawing/2010/main" xmlns="" val="0"/>
+                <a14:useLocalDpi xmlns="" xmlns:a14="http://schemas.microsoft.com/office/drawing/2010/main" val="0"/>
               </a:ext>
             </a:extLst>
           </a:blip>
@@ -4112,7 +4144,7 @@
           <a:noFill/>
           <a:extLst>
             <a:ext uri="{909E8E84-426E-40DD-AFC4-6F175D3DCCD1}">
-              <a14:hiddenFill xmlns:a14="http://schemas.microsoft.com/office/drawing/2010/main" xmlns="">
+              <a14:hiddenFill xmlns="" xmlns:a14="http://schemas.microsoft.com/office/drawing/2010/main">
                 <a:solidFill>
                   <a:srgbClr val="FFFFFF"/>
                 </a:solidFill>
@@ -4126,7 +4158,7 @@
           <p:cNvPr id="2" name="Date Placeholder 1">
             <a:extLst>
               <a:ext uri="{FF2B5EF4-FFF2-40B4-BE49-F238E27FC236}">
-                <a16:creationId xmlns:a16="http://schemas.microsoft.com/office/drawing/2014/main" xmlns="" id="{1FEBBEBC-180F-4554-9433-0F45F01ADA17}"/>
+                <a16:creationId xmlns="" xmlns:a16="http://schemas.microsoft.com/office/drawing/2014/main" id="{1FEBBEBC-180F-4554-9433-0F45F01ADA17}"/>
               </a:ext>
             </a:extLst>
           </p:cNvPr>
@@ -4156,7 +4188,7 @@
           <p:cNvPr id="3" name="Slide Number Placeholder 2">
             <a:extLst>
               <a:ext uri="{FF2B5EF4-FFF2-40B4-BE49-F238E27FC236}">
-                <a16:creationId xmlns:a16="http://schemas.microsoft.com/office/drawing/2014/main" xmlns="" id="{22219251-2539-4EA6-9027-2F2AE5C97949}"/>
+                <a16:creationId xmlns="" xmlns:a16="http://schemas.microsoft.com/office/drawing/2014/main" id="{22219251-2539-4EA6-9027-2F2AE5C97949}"/>
               </a:ext>
             </a:extLst>
           </p:cNvPr>
@@ -4186,7 +4218,7 @@
           <p:cNvPr id="6" name="Table 6">
             <a:extLst>
               <a:ext uri="{FF2B5EF4-FFF2-40B4-BE49-F238E27FC236}">
-                <a16:creationId xmlns:a16="http://schemas.microsoft.com/office/drawing/2014/main" xmlns="" id="{B83DB7B4-5812-42F9-8D4D-54AA04099C4A}"/>
+                <a16:creationId xmlns="" xmlns:a16="http://schemas.microsoft.com/office/drawing/2014/main" id="{B83DB7B4-5812-42F9-8D4D-54AA04099C4A}"/>
               </a:ext>
             </a:extLst>
           </p:cNvPr>
@@ -4196,7 +4228,7 @@
           <p:nvPr>
             <p:extLst>
               <p:ext uri="{D42A27DB-BD31-4B8C-83A1-F6EECF244321}">
-                <p14:modId xmlns:p14="http://schemas.microsoft.com/office/powerpoint/2010/main" xmlns="" val="2301097977"/>
+                <p14:modId xmlns="" xmlns:p14="http://schemas.microsoft.com/office/powerpoint/2010/main" val="2301097977"/>
               </p:ext>
             </p:extLst>
           </p:nvPr>
@@ -4215,14 +4247,14 @@
                 <a:gridCol w="5207082">
                   <a:extLst>
                     <a:ext uri="{9D8B030D-6E8A-4147-A177-3AD203B41FA5}">
-                      <a16:colId xmlns:a16="http://schemas.microsoft.com/office/drawing/2014/main" xmlns="" val="3291672"/>
+                      <a16:colId xmlns="" xmlns:a16="http://schemas.microsoft.com/office/drawing/2014/main" val="3291672"/>
                     </a:ext>
                   </a:extLst>
                 </a:gridCol>
                 <a:gridCol w="3800376">
                   <a:extLst>
                     <a:ext uri="{9D8B030D-6E8A-4147-A177-3AD203B41FA5}">
-                      <a16:colId xmlns:a16="http://schemas.microsoft.com/office/drawing/2014/main" xmlns="" val="3282628654"/>
+                      <a16:colId xmlns="" xmlns:a16="http://schemas.microsoft.com/office/drawing/2014/main" val="3282628654"/>
                     </a:ext>
                   </a:extLst>
                 </a:gridCol>
@@ -4351,7 +4383,7 @@
                 </a:tc>
                 <a:extLst>
                   <a:ext uri="{0D108BD9-81ED-4DB2-BD59-A6C34878D82A}">
-                    <a16:rowId xmlns:a16="http://schemas.microsoft.com/office/drawing/2014/main" xmlns="" val="2302665074"/>
+                    <a16:rowId xmlns="" xmlns:a16="http://schemas.microsoft.com/office/drawing/2014/main" val="2302665074"/>
                   </a:ext>
                 </a:extLst>
               </a:tr>
@@ -4495,7 +4527,7 @@
                 </a:tc>
                 <a:extLst>
                   <a:ext uri="{0D108BD9-81ED-4DB2-BD59-A6C34878D82A}">
-                    <a16:rowId xmlns:a16="http://schemas.microsoft.com/office/drawing/2014/main" xmlns="" val="3101617131"/>
+                    <a16:rowId xmlns="" xmlns:a16="http://schemas.microsoft.com/office/drawing/2014/main" val="3101617131"/>
                   </a:ext>
                 </a:extLst>
               </a:tr>
@@ -4639,7 +4671,7 @@
                 </a:tc>
                 <a:extLst>
                   <a:ext uri="{0D108BD9-81ED-4DB2-BD59-A6C34878D82A}">
-                    <a16:rowId xmlns:a16="http://schemas.microsoft.com/office/drawing/2014/main" xmlns="" val="3378807038"/>
+                    <a16:rowId xmlns="" xmlns:a16="http://schemas.microsoft.com/office/drawing/2014/main" val="3378807038"/>
                   </a:ext>
                 </a:extLst>
               </a:tr>
@@ -4783,7 +4815,7 @@
                 </a:tc>
                 <a:extLst>
                   <a:ext uri="{0D108BD9-81ED-4DB2-BD59-A6C34878D82A}">
-                    <a16:rowId xmlns:a16="http://schemas.microsoft.com/office/drawing/2014/main" xmlns="" val="3064880953"/>
+                    <a16:rowId xmlns="" xmlns:a16="http://schemas.microsoft.com/office/drawing/2014/main" val="3064880953"/>
                   </a:ext>
                 </a:extLst>
               </a:tr>
@@ -4794,7 +4826,7 @@
     </p:spTree>
     <p:extLst>
       <p:ext uri="{BB962C8B-B14F-4D97-AF65-F5344CB8AC3E}">
-        <p14:creationId xmlns:p14="http://schemas.microsoft.com/office/powerpoint/2010/main" xmlns="" val="1664478098"/>
+        <p14:creationId xmlns="" xmlns:p14="http://schemas.microsoft.com/office/powerpoint/2010/main" val="1664478098"/>
       </p:ext>
     </p:extLst>
   </p:cSld>
@@ -4830,13 +4862,7 @@
       </p:grpSpPr>
       <p:sp>
         <p:nvSpPr>
-          <p:cNvPr id="3" name="Content Placeholder 2">
-            <a:extLst>
-              <a:ext uri="{FF2B5EF4-FFF2-40B4-BE49-F238E27FC236}">
-                <a16:creationId xmlns:a16="http://schemas.microsoft.com/office/drawing/2014/main" xmlns="" id="{A5CF9C68-F8E1-43F4-BDDF-866429EC9D1E}"/>
-              </a:ext>
-            </a:extLst>
-          </p:cNvPr>
+          <p:cNvPr id="3" name="Content Placeholder 2"/>
           <p:cNvSpPr>
             <a:spLocks noGrp="1"/>
           </p:cNvSpPr>
@@ -4846,33 +4872,34 @@
         </p:nvSpPr>
         <p:spPr>
           <a:xfrm>
-            <a:off x="838200" y="1074198"/>
-            <a:ext cx="10515600" cy="5102765"/>
+            <a:off x="838200" y="1154097"/>
+            <a:ext cx="10515600" cy="5022866"/>
           </a:xfrm>
         </p:spPr>
         <p:txBody>
           <a:bodyPr/>
           <a:lstStyle/>
           <a:p>
-            <a:pPr marL="0" indent="0" algn="just">
+            <a:pPr algn="just">
+              <a:buFont typeface="Wingdings" panose="05000000000000000000" pitchFamily="2" charset="2"/>
+              <a:buChar char="Ø"/>
+            </a:pPr>
+            <a:r>
+              <a:rPr lang="en-US" dirty="0" smtClean="0"/>
+              <a:t>MATLAB</a:t>
+            </a:r>
+          </a:p>
+          <a:p>
+            <a:pPr algn="just">
               <a:buNone/>
             </a:pPr>
-            <a:r>
-              <a:rPr lang="en-US" dirty="0"/>
-              <a:t>This project is to develop a deep neural network so that the power system faults can be diagnosed. We will try to classify them as much faults as possible using deep neural networks and further improvements in the project will be informed.</a:t>
-            </a:r>
-          </a:p>
-        </p:txBody>
-      </p:sp>
-      <p:sp>
-        <p:nvSpPr>
-          <p:cNvPr id="4" name="Date Placeholder 3">
-            <a:extLst>
-              <a:ext uri="{FF2B5EF4-FFF2-40B4-BE49-F238E27FC236}">
-                <a16:creationId xmlns:a16="http://schemas.microsoft.com/office/drawing/2014/main" xmlns="" id="{D76066D8-4017-49D3-A74C-39BDED6144EB}"/>
-              </a:ext>
-            </a:extLst>
-          </p:cNvPr>
+            <a:endParaRPr lang="en-US" dirty="0" smtClean="0"/>
+          </a:p>
+        </p:txBody>
+      </p:sp>
+      <p:sp>
+        <p:nvSpPr>
+          <p:cNvPr id="4" name="Date Placeholder 3"/>
           <p:cNvSpPr>
             <a:spLocks noGrp="1"/>
           </p:cNvSpPr>
@@ -4896,13 +4923,7 @@
       </p:sp>
       <p:sp>
         <p:nvSpPr>
-          <p:cNvPr id="5" name="Slide Number Placeholder 4">
-            <a:extLst>
-              <a:ext uri="{FF2B5EF4-FFF2-40B4-BE49-F238E27FC236}">
-                <a16:creationId xmlns:a16="http://schemas.microsoft.com/office/drawing/2014/main" xmlns="" id="{114D5F59-C1E5-4B1A-BA66-70D0B6F715EE}"/>
-              </a:ext>
-            </a:extLst>
-          </p:cNvPr>
+          <p:cNvPr id="5" name="Slide Number Placeholder 4"/>
           <p:cNvSpPr>
             <a:spLocks noGrp="1"/>
           </p:cNvSpPr>
@@ -4929,7 +4950,7 @@
           <p:cNvPr id="6" name="TextBox 5">
             <a:extLst>
               <a:ext uri="{FF2B5EF4-FFF2-40B4-BE49-F238E27FC236}">
-                <a16:creationId xmlns:a16="http://schemas.microsoft.com/office/drawing/2014/main" xmlns="" id="{B6C99EC1-F94B-44CB-A3E1-D211B377218D}"/>
+                <a16:creationId xmlns="" xmlns:a16="http://schemas.microsoft.com/office/drawing/2014/main" id="{74347C76-4F23-44C2-8A76-7BCB3209A5F3}"/>
               </a:ext>
             </a:extLst>
           </p:cNvPr>
@@ -4938,7 +4959,7 @@
         </p:nvSpPr>
         <p:spPr>
           <a:xfrm>
-            <a:off x="838200" y="339109"/>
+            <a:off x="838200" y="347987"/>
             <a:ext cx="10622872" cy="584775"/>
           </a:xfrm>
           <a:prstGeom prst="rect">
@@ -4954,26 +4975,38 @@
           <a:p>
             <a:pPr algn="ctr"/>
             <a:r>
-              <a:rPr lang="en-IN" sz="3200" b="1" u="sng" dirty="0">
+              <a:rPr lang="en-IN" sz="3200" b="1" u="sng" dirty="0" smtClean="0">
                 <a:solidFill>
                   <a:srgbClr val="FF0000"/>
                 </a:solidFill>
               </a:rPr>
-              <a:t>Conclusion </a:t>
-            </a:r>
+              <a:t>Road Map</a:t>
+            </a:r>
+            <a:endParaRPr lang="en-IN" sz="3200" b="1" u="sng" dirty="0">
+              <a:solidFill>
+                <a:srgbClr val="FF0000"/>
+              </a:solidFill>
+            </a:endParaRPr>
           </a:p>
         </p:txBody>
       </p:sp>
     </p:spTree>
     <p:extLst>
       <p:ext uri="{BB962C8B-B14F-4D97-AF65-F5344CB8AC3E}">
-        <p14:creationId xmlns:p14="http://schemas.microsoft.com/office/powerpoint/2010/main" xmlns="" val="4028563155"/>
+        <p14:creationId xmlns="" xmlns:p14="http://schemas.microsoft.com/office/powerpoint/2010/main" val="1906710318"/>
       </p:ext>
     </p:extLst>
   </p:cSld>
   <p:clrMapOvr>
     <a:masterClrMapping/>
   </p:clrMapOvr>
+  <p:timing>
+    <p:tnLst>
+      <p:par>
+        <p:cTn id="1" dur="indefinite" restart="never" nodeType="tmRoot"/>
+      </p:par>
+    </p:tnLst>
+  </p:timing>
 </p:sld>
 </file>
 
@@ -4996,10 +5029,366 @@
       </p:grpSpPr>
       <p:sp>
         <p:nvSpPr>
+          <p:cNvPr id="3" name="Content Placeholder 2"/>
+          <p:cNvSpPr>
+            <a:spLocks noGrp="1"/>
+          </p:cNvSpPr>
+          <p:nvPr>
+            <p:ph idx="1"/>
+          </p:nvPr>
+        </p:nvSpPr>
+        <p:spPr>
+          <a:xfrm>
+            <a:off x="838200" y="1154097"/>
+            <a:ext cx="10515600" cy="5022866"/>
+          </a:xfrm>
+        </p:spPr>
+        <p:txBody>
+          <a:bodyPr/>
+          <a:lstStyle/>
+          <a:p>
+            <a:pPr algn="just">
+              <a:buFont typeface="Wingdings" panose="05000000000000000000" pitchFamily="2" charset="2"/>
+              <a:buChar char="Ø"/>
+            </a:pPr>
+            <a:r>
+              <a:rPr lang="en-US" dirty="0"/>
+              <a:t>The faults in the power system will play a major role in the system stability</a:t>
+            </a:r>
+          </a:p>
+          <a:p>
+            <a:pPr algn="just">
+              <a:buFont typeface="Wingdings" panose="05000000000000000000" pitchFamily="2" charset="2"/>
+              <a:buChar char="Ø"/>
+            </a:pPr>
+            <a:r>
+              <a:rPr lang="en-US" dirty="0"/>
+              <a:t>Fault classification is important for the operation of the healthy phases.</a:t>
+            </a:r>
+          </a:p>
+          <a:p>
+            <a:pPr algn="just">
+              <a:buFont typeface="Wingdings" panose="05000000000000000000" pitchFamily="2" charset="2"/>
+              <a:buChar char="Ø"/>
+            </a:pPr>
+            <a:r>
+              <a:rPr lang="en-US" dirty="0"/>
+              <a:t>Power system reliability gets improved.</a:t>
+            </a:r>
+          </a:p>
+          <a:p>
+            <a:pPr algn="just">
+              <a:buFont typeface="Wingdings" panose="05000000000000000000" pitchFamily="2" charset="2"/>
+              <a:buChar char="Ø"/>
+            </a:pPr>
+            <a:endParaRPr lang="en-US" dirty="0"/>
+          </a:p>
+        </p:txBody>
+      </p:sp>
+      <p:sp>
+        <p:nvSpPr>
+          <p:cNvPr id="4" name="Date Placeholder 3"/>
+          <p:cNvSpPr>
+            <a:spLocks noGrp="1"/>
+          </p:cNvSpPr>
+          <p:nvPr>
+            <p:ph type="dt" sz="half" idx="10"/>
+          </p:nvPr>
+        </p:nvSpPr>
+        <p:spPr/>
+        <p:txBody>
+          <a:bodyPr/>
+          <a:lstStyle/>
+          <a:p>
+            <a:fld id="{7E3FDB0B-B014-4C47-949F-40696701F18D}" type="datetime1">
+              <a:rPr lang="en-US" smtClean="0"/>
+              <a:pPr/>
+              <a:t>1/28/2020</a:t>
+            </a:fld>
+            <a:endParaRPr lang="en-US"/>
+          </a:p>
+        </p:txBody>
+      </p:sp>
+      <p:sp>
+        <p:nvSpPr>
+          <p:cNvPr id="5" name="Slide Number Placeholder 4"/>
+          <p:cNvSpPr>
+            <a:spLocks noGrp="1"/>
+          </p:cNvSpPr>
+          <p:nvPr>
+            <p:ph type="sldNum" sz="quarter" idx="12"/>
+          </p:nvPr>
+        </p:nvSpPr>
+        <p:spPr/>
+        <p:txBody>
+          <a:bodyPr/>
+          <a:lstStyle/>
+          <a:p>
+            <a:fld id="{330EA680-D336-4FF7-8B7A-9848BB0A1C32}" type="slidenum">
+              <a:rPr lang="en-US" smtClean="0"/>
+              <a:pPr/>
+              <a:t>11</a:t>
+            </a:fld>
+            <a:endParaRPr lang="en-US"/>
+          </a:p>
+        </p:txBody>
+      </p:sp>
+      <p:sp>
+        <p:nvSpPr>
+          <p:cNvPr id="6" name="TextBox 5">
+            <a:extLst>
+              <a:ext uri="{FF2B5EF4-FFF2-40B4-BE49-F238E27FC236}">
+                <a16:creationId xmlns="" xmlns:a16="http://schemas.microsoft.com/office/drawing/2014/main" id="{74347C76-4F23-44C2-8A76-7BCB3209A5F3}"/>
+              </a:ext>
+            </a:extLst>
+          </p:cNvPr>
+          <p:cNvSpPr txBox="1"/>
+          <p:nvPr/>
+        </p:nvSpPr>
+        <p:spPr>
+          <a:xfrm>
+            <a:off x="838200" y="347987"/>
+            <a:ext cx="10622872" cy="584775"/>
+          </a:xfrm>
+          <a:prstGeom prst="rect">
+            <a:avLst/>
+          </a:prstGeom>
+          <a:noFill/>
+        </p:spPr>
+        <p:txBody>
+          <a:bodyPr wrap="square" rtlCol="0">
+            <a:spAutoFit/>
+          </a:bodyPr>
+          <a:lstStyle/>
+          <a:p>
+            <a:pPr algn="ctr"/>
+            <a:r>
+              <a:rPr lang="en-IN" sz="3200" b="1" u="sng">
+                <a:solidFill>
+                  <a:srgbClr val="FF0000"/>
+                </a:solidFill>
+              </a:rPr>
+              <a:t>Applications</a:t>
+            </a:r>
+          </a:p>
+        </p:txBody>
+      </p:sp>
+    </p:spTree>
+    <p:extLst>
+      <p:ext uri="{BB962C8B-B14F-4D97-AF65-F5344CB8AC3E}">
+        <p14:creationId xmlns="" xmlns:p14="http://schemas.microsoft.com/office/powerpoint/2010/main" val="1906710318"/>
+      </p:ext>
+    </p:extLst>
+  </p:cSld>
+  <p:clrMapOvr>
+    <a:masterClrMapping/>
+  </p:clrMapOvr>
+  <p:timing>
+    <p:tnLst>
+      <p:par>
+        <p:cTn id="1" dur="indefinite" restart="never" nodeType="tmRoot"/>
+      </p:par>
+    </p:tnLst>
+  </p:timing>
+</p:sld>
+</file>
+
+<file path=ppt/slides/slide12.xml><?xml version="1.0" encoding="utf-8"?>
+<p:sld xmlns:a="http://schemas.openxmlformats.org/drawingml/2006/main" xmlns:r="http://schemas.openxmlformats.org/officeDocument/2006/relationships" xmlns:p="http://schemas.openxmlformats.org/presentationml/2006/main">
+  <p:cSld>
+    <p:spTree>
+      <p:nvGrpSpPr>
+        <p:cNvPr id="1" name=""/>
+        <p:cNvGrpSpPr/>
+        <p:nvPr/>
+      </p:nvGrpSpPr>
+      <p:grpSpPr>
+        <a:xfrm>
+          <a:off x="0" y="0"/>
+          <a:ext cx="0" cy="0"/>
+          <a:chOff x="0" y="0"/>
+          <a:chExt cx="0" cy="0"/>
+        </a:xfrm>
+      </p:grpSpPr>
+      <p:sp>
+        <p:nvSpPr>
+          <p:cNvPr id="3" name="Content Placeholder 2">
+            <a:extLst>
+              <a:ext uri="{FF2B5EF4-FFF2-40B4-BE49-F238E27FC236}">
+                <a16:creationId xmlns="" xmlns:a16="http://schemas.microsoft.com/office/drawing/2014/main" id="{A5CF9C68-F8E1-43F4-BDDF-866429EC9D1E}"/>
+              </a:ext>
+            </a:extLst>
+          </p:cNvPr>
+          <p:cNvSpPr>
+            <a:spLocks noGrp="1"/>
+          </p:cNvSpPr>
+          <p:nvPr>
+            <p:ph idx="1"/>
+          </p:nvPr>
+        </p:nvSpPr>
+        <p:spPr>
+          <a:xfrm>
+            <a:off x="838200" y="1074198"/>
+            <a:ext cx="10515600" cy="5102765"/>
+          </a:xfrm>
+        </p:spPr>
+        <p:txBody>
+          <a:bodyPr/>
+          <a:lstStyle/>
+          <a:p>
+            <a:pPr marL="0" indent="0" algn="just">
+              <a:buNone/>
+            </a:pPr>
+            <a:r>
+              <a:rPr lang="en-US" dirty="0"/>
+              <a:t>This project is to develop a deep neural network so that the power system faults can be diagnosed. We will try to classify them as much faults as possible using deep neural networks and further improvements in the project will be informed.</a:t>
+            </a:r>
+          </a:p>
+        </p:txBody>
+      </p:sp>
+      <p:sp>
+        <p:nvSpPr>
+          <p:cNvPr id="4" name="Date Placeholder 3">
+            <a:extLst>
+              <a:ext uri="{FF2B5EF4-FFF2-40B4-BE49-F238E27FC236}">
+                <a16:creationId xmlns="" xmlns:a16="http://schemas.microsoft.com/office/drawing/2014/main" id="{D76066D8-4017-49D3-A74C-39BDED6144EB}"/>
+              </a:ext>
+            </a:extLst>
+          </p:cNvPr>
+          <p:cNvSpPr>
+            <a:spLocks noGrp="1"/>
+          </p:cNvSpPr>
+          <p:nvPr>
+            <p:ph type="dt" sz="half" idx="10"/>
+          </p:nvPr>
+        </p:nvSpPr>
+        <p:spPr/>
+        <p:txBody>
+          <a:bodyPr/>
+          <a:lstStyle/>
+          <a:p>
+            <a:fld id="{7E3FDB0B-B014-4C47-949F-40696701F18D}" type="datetime1">
+              <a:rPr lang="en-US" smtClean="0"/>
+              <a:pPr/>
+              <a:t>1/28/2020</a:t>
+            </a:fld>
+            <a:endParaRPr lang="en-US"/>
+          </a:p>
+        </p:txBody>
+      </p:sp>
+      <p:sp>
+        <p:nvSpPr>
+          <p:cNvPr id="5" name="Slide Number Placeholder 4">
+            <a:extLst>
+              <a:ext uri="{FF2B5EF4-FFF2-40B4-BE49-F238E27FC236}">
+                <a16:creationId xmlns="" xmlns:a16="http://schemas.microsoft.com/office/drawing/2014/main" id="{114D5F59-C1E5-4B1A-BA66-70D0B6F715EE}"/>
+              </a:ext>
+            </a:extLst>
+          </p:cNvPr>
+          <p:cNvSpPr>
+            <a:spLocks noGrp="1"/>
+          </p:cNvSpPr>
+          <p:nvPr>
+            <p:ph type="sldNum" sz="quarter" idx="12"/>
+          </p:nvPr>
+        </p:nvSpPr>
+        <p:spPr/>
+        <p:txBody>
+          <a:bodyPr/>
+          <a:lstStyle/>
+          <a:p>
+            <a:fld id="{330EA680-D336-4FF7-8B7A-9848BB0A1C32}" type="slidenum">
+              <a:rPr lang="en-US" smtClean="0"/>
+              <a:pPr/>
+              <a:t>12</a:t>
+            </a:fld>
+            <a:endParaRPr lang="en-US"/>
+          </a:p>
+        </p:txBody>
+      </p:sp>
+      <p:sp>
+        <p:nvSpPr>
+          <p:cNvPr id="6" name="TextBox 5">
+            <a:extLst>
+              <a:ext uri="{FF2B5EF4-FFF2-40B4-BE49-F238E27FC236}">
+                <a16:creationId xmlns="" xmlns:a16="http://schemas.microsoft.com/office/drawing/2014/main" id="{B6C99EC1-F94B-44CB-A3E1-D211B377218D}"/>
+              </a:ext>
+            </a:extLst>
+          </p:cNvPr>
+          <p:cNvSpPr txBox="1"/>
+          <p:nvPr/>
+        </p:nvSpPr>
+        <p:spPr>
+          <a:xfrm>
+            <a:off x="838200" y="339109"/>
+            <a:ext cx="10622872" cy="584775"/>
+          </a:xfrm>
+          <a:prstGeom prst="rect">
+            <a:avLst/>
+          </a:prstGeom>
+          <a:noFill/>
+        </p:spPr>
+        <p:txBody>
+          <a:bodyPr wrap="square" rtlCol="0">
+            <a:spAutoFit/>
+          </a:bodyPr>
+          <a:lstStyle/>
+          <a:p>
+            <a:pPr algn="ctr"/>
+            <a:r>
+              <a:rPr lang="en-IN" sz="3200" b="1" u="sng" dirty="0">
+                <a:solidFill>
+                  <a:srgbClr val="FF0000"/>
+                </a:solidFill>
+              </a:rPr>
+              <a:t>Conclusion </a:t>
+            </a:r>
+          </a:p>
+        </p:txBody>
+      </p:sp>
+    </p:spTree>
+    <p:extLst>
+      <p:ext uri="{BB962C8B-B14F-4D97-AF65-F5344CB8AC3E}">
+        <p14:creationId xmlns="" xmlns:p14="http://schemas.microsoft.com/office/powerpoint/2010/main" val="4028563155"/>
+      </p:ext>
+    </p:extLst>
+  </p:cSld>
+  <p:clrMapOvr>
+    <a:masterClrMapping/>
+  </p:clrMapOvr>
+  <p:timing>
+    <p:tnLst>
+      <p:par>
+        <p:cTn id="1" dur="indefinite" restart="never" nodeType="tmRoot"/>
+      </p:par>
+    </p:tnLst>
+  </p:timing>
+</p:sld>
+</file>
+
+<file path=ppt/slides/slide13.xml><?xml version="1.0" encoding="utf-8"?>
+<p:sld xmlns:a="http://schemas.openxmlformats.org/drawingml/2006/main" xmlns:r="http://schemas.openxmlformats.org/officeDocument/2006/relationships" xmlns:p="http://schemas.openxmlformats.org/presentationml/2006/main">
+  <p:cSld>
+    <p:spTree>
+      <p:nvGrpSpPr>
+        <p:cNvPr id="1" name=""/>
+        <p:cNvGrpSpPr/>
+        <p:nvPr/>
+      </p:nvGrpSpPr>
+      <p:grpSpPr>
+        <a:xfrm>
+          <a:off x="0" y="0"/>
+          <a:ext cx="0" cy="0"/>
+          <a:chOff x="0" y="0"/>
+          <a:chExt cx="0" cy="0"/>
+        </a:xfrm>
+      </p:grpSpPr>
+      <p:sp>
+        <p:nvSpPr>
           <p:cNvPr id="4" name="TextBox 3">
             <a:extLst>
               <a:ext uri="{FF2B5EF4-FFF2-40B4-BE49-F238E27FC236}">
-                <a16:creationId xmlns:a16="http://schemas.microsoft.com/office/drawing/2014/main" xmlns="" id="{C4BB6DEF-F39C-40B0-B60B-2E342DDF5922}"/>
+                <a16:creationId xmlns="" xmlns:a16="http://schemas.microsoft.com/office/drawing/2014/main" id="{C4BB6DEF-F39C-40B0-B60B-2E342DDF5922}"/>
               </a:ext>
             </a:extLst>
           </p:cNvPr>
@@ -5039,7 +5428,7 @@
           <p:cNvPr id="3" name="Date Placeholder 2">
             <a:extLst>
               <a:ext uri="{FF2B5EF4-FFF2-40B4-BE49-F238E27FC236}">
-                <a16:creationId xmlns:a16="http://schemas.microsoft.com/office/drawing/2014/main" xmlns="" id="{3000AC7D-C646-4A26-934D-95EC7158415E}"/>
+                <a16:creationId xmlns="" xmlns:a16="http://schemas.microsoft.com/office/drawing/2014/main" id="{3000AC7D-C646-4A26-934D-95EC7158415E}"/>
               </a:ext>
             </a:extLst>
           </p:cNvPr>
@@ -5069,7 +5458,7 @@
           <p:cNvPr id="5" name="Slide Number Placeholder 4">
             <a:extLst>
               <a:ext uri="{FF2B5EF4-FFF2-40B4-BE49-F238E27FC236}">
-                <a16:creationId xmlns:a16="http://schemas.microsoft.com/office/drawing/2014/main" xmlns="" id="{C8B981BA-7AE4-4E6C-9012-F1DBF6F72A23}"/>
+                <a16:creationId xmlns="" xmlns:a16="http://schemas.microsoft.com/office/drawing/2014/main" id="{C8B981BA-7AE4-4E6C-9012-F1DBF6F72A23}"/>
               </a:ext>
             </a:extLst>
           </p:cNvPr>
@@ -5088,7 +5477,7 @@
             <a:fld id="{330EA680-D336-4FF7-8B7A-9848BB0A1C32}" type="slidenum">
               <a:rPr lang="en-US" smtClean="0"/>
               <a:pPr/>
-              <a:t>11</a:t>
+              <a:t>13</a:t>
             </a:fld>
             <a:endParaRPr lang="en-US"/>
           </a:p>
@@ -5099,7 +5488,7 @@
           <p:cNvPr id="6" name="Table 6">
             <a:extLst>
               <a:ext uri="{FF2B5EF4-FFF2-40B4-BE49-F238E27FC236}">
-                <a16:creationId xmlns:a16="http://schemas.microsoft.com/office/drawing/2014/main" xmlns="" id="{AC9E14EC-3F02-449A-AD8E-DE30BE95F792}"/>
+                <a16:creationId xmlns="" xmlns:a16="http://schemas.microsoft.com/office/drawing/2014/main" id="{AC9E14EC-3F02-449A-AD8E-DE30BE95F792}"/>
               </a:ext>
             </a:extLst>
           </p:cNvPr>
@@ -5109,7 +5498,7 @@
           <p:nvPr>
             <p:extLst>
               <p:ext uri="{D42A27DB-BD31-4B8C-83A1-F6EECF244321}">
-                <p14:modId xmlns:p14="http://schemas.microsoft.com/office/powerpoint/2010/main" xmlns="" val="893868250"/>
+                <p14:modId xmlns="" xmlns:p14="http://schemas.microsoft.com/office/powerpoint/2010/main" val="893868250"/>
               </p:ext>
             </p:extLst>
           </p:nvPr>
@@ -5128,14 +5517,14 @@
                 <a:gridCol w="661800">
                   <a:extLst>
                     <a:ext uri="{9D8B030D-6E8A-4147-A177-3AD203B41FA5}">
-                      <a16:colId xmlns:a16="http://schemas.microsoft.com/office/drawing/2014/main" xmlns="" val="3448325611"/>
+                      <a16:colId xmlns="" xmlns:a16="http://schemas.microsoft.com/office/drawing/2014/main" val="3448325611"/>
                     </a:ext>
                   </a:extLst>
                 </a:gridCol>
                 <a:gridCol w="9848621">
                   <a:extLst>
                     <a:ext uri="{9D8B030D-6E8A-4147-A177-3AD203B41FA5}">
-                      <a16:colId xmlns:a16="http://schemas.microsoft.com/office/drawing/2014/main" xmlns="" val="393581948"/>
+                      <a16:colId xmlns="" xmlns:a16="http://schemas.microsoft.com/office/drawing/2014/main" val="393581948"/>
                     </a:ext>
                   </a:extLst>
                 </a:gridCol>
@@ -5277,7 +5666,7 @@
                 </a:tc>
                 <a:extLst>
                   <a:ext uri="{0D108BD9-81ED-4DB2-BD59-A6C34878D82A}">
-                    <a16:rowId xmlns:a16="http://schemas.microsoft.com/office/drawing/2014/main" xmlns="" val="2982736879"/>
+                    <a16:rowId xmlns="" xmlns:a16="http://schemas.microsoft.com/office/drawing/2014/main" val="2982736879"/>
                   </a:ext>
                 </a:extLst>
               </a:tr>
@@ -5430,7 +5819,7 @@
                 </a:tc>
                 <a:extLst>
                   <a:ext uri="{0D108BD9-81ED-4DB2-BD59-A6C34878D82A}">
-                    <a16:rowId xmlns:a16="http://schemas.microsoft.com/office/drawing/2014/main" xmlns="" val="3000277682"/>
+                    <a16:rowId xmlns="" xmlns:a16="http://schemas.microsoft.com/office/drawing/2014/main" val="3000277682"/>
                   </a:ext>
                 </a:extLst>
               </a:tr>
@@ -5595,7 +5984,7 @@
                 </a:tc>
                 <a:extLst>
                   <a:ext uri="{0D108BD9-81ED-4DB2-BD59-A6C34878D82A}">
-                    <a16:rowId xmlns:a16="http://schemas.microsoft.com/office/drawing/2014/main" xmlns="" val="1892891298"/>
+                    <a16:rowId xmlns="" xmlns:a16="http://schemas.microsoft.com/office/drawing/2014/main" val="1892891298"/>
                   </a:ext>
                 </a:extLst>
               </a:tr>
@@ -5736,7 +6125,7 @@
                 </a:tc>
                 <a:extLst>
                   <a:ext uri="{0D108BD9-81ED-4DB2-BD59-A6C34878D82A}">
-                    <a16:rowId xmlns:a16="http://schemas.microsoft.com/office/drawing/2014/main" xmlns="" val="548713284"/>
+                    <a16:rowId xmlns="" xmlns:a16="http://schemas.microsoft.com/office/drawing/2014/main" val="548713284"/>
                   </a:ext>
                 </a:extLst>
               </a:tr>
@@ -5973,7 +6362,7 @@
                 </a:tc>
                 <a:extLst>
                   <a:ext uri="{0D108BD9-81ED-4DB2-BD59-A6C34878D82A}">
-                    <a16:rowId xmlns:a16="http://schemas.microsoft.com/office/drawing/2014/main" xmlns="" val="252214642"/>
+                    <a16:rowId xmlns="" xmlns:a16="http://schemas.microsoft.com/office/drawing/2014/main" val="252214642"/>
                   </a:ext>
                 </a:extLst>
               </a:tr>
@@ -6138,7 +6527,7 @@
                 </a:tc>
                 <a:extLst>
                   <a:ext uri="{0D108BD9-81ED-4DB2-BD59-A6C34878D82A}">
-                    <a16:rowId xmlns:a16="http://schemas.microsoft.com/office/drawing/2014/main" xmlns="" val="3489601737"/>
+                    <a16:rowId xmlns="" xmlns:a16="http://schemas.microsoft.com/office/drawing/2014/main" val="3489601737"/>
                   </a:ext>
                 </a:extLst>
               </a:tr>
@@ -6279,7 +6668,7 @@
                 </a:tc>
                 <a:extLst>
                   <a:ext uri="{0D108BD9-81ED-4DB2-BD59-A6C34878D82A}">
-                    <a16:rowId xmlns:a16="http://schemas.microsoft.com/office/drawing/2014/main" xmlns="" val="2688330897"/>
+                    <a16:rowId xmlns="" xmlns:a16="http://schemas.microsoft.com/office/drawing/2014/main" val="2688330897"/>
                   </a:ext>
                 </a:extLst>
               </a:tr>
@@ -6290,17 +6679,24 @@
     </p:spTree>
     <p:extLst>
       <p:ext uri="{BB962C8B-B14F-4D97-AF65-F5344CB8AC3E}">
-        <p14:creationId xmlns:p14="http://schemas.microsoft.com/office/powerpoint/2010/main" xmlns="" val="844048752"/>
+        <p14:creationId xmlns="" xmlns:p14="http://schemas.microsoft.com/office/powerpoint/2010/main" val="844048752"/>
       </p:ext>
     </p:extLst>
   </p:cSld>
   <p:clrMapOvr>
     <a:masterClrMapping/>
   </p:clrMapOvr>
+  <p:timing>
+    <p:tnLst>
+      <p:par>
+        <p:cTn id="1" dur="indefinite" restart="never" nodeType="tmRoot"/>
+      </p:par>
+    </p:tnLst>
+  </p:timing>
 </p:sld>
 </file>
 
-<file path=ppt/slides/slide12.xml><?xml version="1.0" encoding="utf-8"?>
+<file path=ppt/slides/slide14.xml><?xml version="1.0" encoding="utf-8"?>
 <p:sld xmlns:a="http://schemas.openxmlformats.org/drawingml/2006/main" xmlns:r="http://schemas.openxmlformats.org/officeDocument/2006/relationships" xmlns:p="http://schemas.openxmlformats.org/presentationml/2006/main">
   <p:cSld>
     <p:spTree>
@@ -6322,7 +6718,7 @@
           <p:cNvPr id="3" name="Content Placeholder 2">
             <a:extLst>
               <a:ext uri="{FF2B5EF4-FFF2-40B4-BE49-F238E27FC236}">
-                <a16:creationId xmlns:a16="http://schemas.microsoft.com/office/drawing/2014/main" xmlns="" id="{A5CF9C68-F8E1-43F4-BDDF-866429EC9D1E}"/>
+                <a16:creationId xmlns="" xmlns:a16="http://schemas.microsoft.com/office/drawing/2014/main" id="{A5CF9C68-F8E1-43F4-BDDF-866429EC9D1E}"/>
               </a:ext>
             </a:extLst>
           </p:cNvPr>
@@ -6358,7 +6754,7 @@
           <p:cNvPr id="4" name="Date Placeholder 3">
             <a:extLst>
               <a:ext uri="{FF2B5EF4-FFF2-40B4-BE49-F238E27FC236}">
-                <a16:creationId xmlns:a16="http://schemas.microsoft.com/office/drawing/2014/main" xmlns="" id="{D76066D8-4017-49D3-A74C-39BDED6144EB}"/>
+                <a16:creationId xmlns="" xmlns:a16="http://schemas.microsoft.com/office/drawing/2014/main" id="{D76066D8-4017-49D3-A74C-39BDED6144EB}"/>
               </a:ext>
             </a:extLst>
           </p:cNvPr>
@@ -6388,7 +6784,7 @@
           <p:cNvPr id="5" name="Slide Number Placeholder 4">
             <a:extLst>
               <a:ext uri="{FF2B5EF4-FFF2-40B4-BE49-F238E27FC236}">
-                <a16:creationId xmlns:a16="http://schemas.microsoft.com/office/drawing/2014/main" xmlns="" id="{114D5F59-C1E5-4B1A-BA66-70D0B6F715EE}"/>
+                <a16:creationId xmlns="" xmlns:a16="http://schemas.microsoft.com/office/drawing/2014/main" id="{114D5F59-C1E5-4B1A-BA66-70D0B6F715EE}"/>
               </a:ext>
             </a:extLst>
           </p:cNvPr>
@@ -6407,7 +6803,7 @@
             <a:fld id="{330EA680-D336-4FF7-8B7A-9848BB0A1C32}" type="slidenum">
               <a:rPr lang="en-US" smtClean="0"/>
               <a:pPr/>
-              <a:t>12</a:t>
+              <a:t>14</a:t>
             </a:fld>
             <a:endParaRPr lang="en-US"/>
           </a:p>
@@ -6418,7 +6814,7 @@
           <p:cNvPr id="6" name="TextBox 5">
             <a:extLst>
               <a:ext uri="{FF2B5EF4-FFF2-40B4-BE49-F238E27FC236}">
-                <a16:creationId xmlns:a16="http://schemas.microsoft.com/office/drawing/2014/main" xmlns="" id="{B6C99EC1-F94B-44CB-A3E1-D211B377218D}"/>
+                <a16:creationId xmlns="" xmlns:a16="http://schemas.microsoft.com/office/drawing/2014/main" id="{B6C99EC1-F94B-44CB-A3E1-D211B377218D}"/>
               </a:ext>
             </a:extLst>
           </p:cNvPr>
@@ -6448,15 +6844,7 @@
                   <a:srgbClr val="FF0000"/>
                 </a:solidFill>
               </a:rPr>
-              <a:t>CO – PO Mapping</a:t>
-            </a:r>
-            <a:r>
-              <a:rPr lang="en-IN" sz="3200" b="1" u="sng" dirty="0" smtClean="0">
-                <a:solidFill>
-                  <a:srgbClr val="FF0000"/>
-                </a:solidFill>
-              </a:rPr>
-              <a:t> </a:t>
+              <a:t>CO – PO Mapping </a:t>
             </a:r>
             <a:endParaRPr lang="en-IN" sz="3200" b="1" u="sng" dirty="0">
               <a:solidFill>
@@ -6469,17 +6857,24 @@
     </p:spTree>
     <p:extLst>
       <p:ext uri="{BB962C8B-B14F-4D97-AF65-F5344CB8AC3E}">
-        <p14:creationId xmlns:p14="http://schemas.microsoft.com/office/powerpoint/2010/main" xmlns="" val="4028563155"/>
+        <p14:creationId xmlns="" xmlns:p14="http://schemas.microsoft.com/office/powerpoint/2010/main" val="4028563155"/>
       </p:ext>
     </p:extLst>
   </p:cSld>
   <p:clrMapOvr>
     <a:masterClrMapping/>
   </p:clrMapOvr>
+  <p:timing>
+    <p:tnLst>
+      <p:par>
+        <p:cTn id="1" dur="indefinite" restart="never" nodeType="tmRoot"/>
+      </p:par>
+    </p:tnLst>
+  </p:timing>
 </p:sld>
 </file>
 
-<file path=ppt/slides/slide13.xml><?xml version="1.0" encoding="utf-8"?>
+<file path=ppt/slides/slide15.xml><?xml version="1.0" encoding="utf-8"?>
 <p:sld xmlns:a="http://schemas.openxmlformats.org/drawingml/2006/main" xmlns:r="http://schemas.openxmlformats.org/officeDocument/2006/relationships" xmlns:p="http://schemas.openxmlformats.org/presentationml/2006/main">
   <p:cSld>
     <p:spTree>
@@ -6501,7 +6896,7 @@
           <p:cNvPr id="2" name="Title 1">
             <a:extLst>
               <a:ext uri="{FF2B5EF4-FFF2-40B4-BE49-F238E27FC236}">
-                <a16:creationId xmlns:a16="http://schemas.microsoft.com/office/drawing/2014/main" xmlns="" id="{6DCB1159-D691-4B53-B1A6-D9B3A79BE525}"/>
+                <a16:creationId xmlns="" xmlns:a16="http://schemas.microsoft.com/office/drawing/2014/main" id="{6DCB1159-D691-4B53-B1A6-D9B3A79BE525}"/>
               </a:ext>
             </a:extLst>
           </p:cNvPr>
@@ -6526,7 +6921,7 @@
           <p:cNvPr id="3" name="Date Placeholder 2">
             <a:extLst>
               <a:ext uri="{FF2B5EF4-FFF2-40B4-BE49-F238E27FC236}">
-                <a16:creationId xmlns:a16="http://schemas.microsoft.com/office/drawing/2014/main" xmlns="" id="{6DEC8314-1F46-43E9-87EC-9D327CFD75A2}"/>
+                <a16:creationId xmlns="" xmlns:a16="http://schemas.microsoft.com/office/drawing/2014/main" id="{6DEC8314-1F46-43E9-87EC-9D327CFD75A2}"/>
               </a:ext>
             </a:extLst>
           </p:cNvPr>
@@ -6556,7 +6951,7 @@
           <p:cNvPr id="4" name="Slide Number Placeholder 3">
             <a:extLst>
               <a:ext uri="{FF2B5EF4-FFF2-40B4-BE49-F238E27FC236}">
-                <a16:creationId xmlns:a16="http://schemas.microsoft.com/office/drawing/2014/main" xmlns="" id="{60585039-2C10-4B0D-ABFA-290767B07452}"/>
+                <a16:creationId xmlns="" xmlns:a16="http://schemas.microsoft.com/office/drawing/2014/main" id="{60585039-2C10-4B0D-ABFA-290767B07452}"/>
               </a:ext>
             </a:extLst>
           </p:cNvPr>
@@ -6575,7 +6970,7 @@
             <a:fld id="{330EA680-D336-4FF7-8B7A-9848BB0A1C32}" type="slidenum">
               <a:rPr lang="en-US" smtClean="0"/>
               <a:pPr/>
-              <a:t>13</a:t>
+              <a:t>15</a:t>
             </a:fld>
             <a:endParaRPr lang="en-US"/>
           </a:p>
@@ -6586,7 +6981,7 @@
           <p:cNvPr id="8" name="Picture 7">
             <a:extLst>
               <a:ext uri="{FF2B5EF4-FFF2-40B4-BE49-F238E27FC236}">
-                <a16:creationId xmlns:a16="http://schemas.microsoft.com/office/drawing/2014/main" xmlns="" id="{63F881B9-BB6E-445C-BA3F-A72AD63B9124}"/>
+                <a16:creationId xmlns="" xmlns:a16="http://schemas.microsoft.com/office/drawing/2014/main" id="{63F881B9-BB6E-445C-BA3F-A72AD63B9124}"/>
               </a:ext>
             </a:extLst>
           </p:cNvPr>
@@ -6599,7 +6994,7 @@
           <a:blip r:embed="rId2">
             <a:extLst>
               <a:ext uri="{28A0092B-C50C-407E-A947-70E740481C1C}">
-                <a14:useLocalDpi xmlns:a14="http://schemas.microsoft.com/office/drawing/2010/main" xmlns="" val="0"/>
+                <a14:useLocalDpi xmlns="" xmlns:a14="http://schemas.microsoft.com/office/drawing/2010/main" val="0"/>
               </a:ext>
             </a:extLst>
           </a:blip>
@@ -6620,13 +7015,20 @@
     </p:spTree>
     <p:extLst>
       <p:ext uri="{BB962C8B-B14F-4D97-AF65-F5344CB8AC3E}">
-        <p14:creationId xmlns:p14="http://schemas.microsoft.com/office/powerpoint/2010/main" xmlns="" val="3574002923"/>
+        <p14:creationId xmlns="" xmlns:p14="http://schemas.microsoft.com/office/powerpoint/2010/main" val="3574002923"/>
       </p:ext>
     </p:extLst>
   </p:cSld>
   <p:clrMapOvr>
     <a:masterClrMapping/>
   </p:clrMapOvr>
+  <p:timing>
+    <p:tnLst>
+      <p:par>
+        <p:cTn id="1" dur="indefinite" restart="never" nodeType="tmRoot"/>
+      </p:par>
+    </p:tnLst>
+  </p:timing>
 </p:sld>
 </file>
 
@@ -6652,7 +7054,7 @@
           <p:cNvPr id="5" name="Subtitle 4">
             <a:extLst>
               <a:ext uri="{FF2B5EF4-FFF2-40B4-BE49-F238E27FC236}">
-                <a16:creationId xmlns:a16="http://schemas.microsoft.com/office/drawing/2014/main" xmlns="" id="{25C99C0B-24DC-464E-AEB0-124B0DECD18C}"/>
+                <a16:creationId xmlns="" xmlns:a16="http://schemas.microsoft.com/office/drawing/2014/main" id="{25C99C0B-24DC-464E-AEB0-124B0DECD18C}"/>
               </a:ext>
             </a:extLst>
           </p:cNvPr>
@@ -6789,7 +7191,7 @@
           <p:cNvPr id="6" name="TextBox 5">
             <a:extLst>
               <a:ext uri="{FF2B5EF4-FFF2-40B4-BE49-F238E27FC236}">
-                <a16:creationId xmlns:a16="http://schemas.microsoft.com/office/drawing/2014/main" xmlns="" id="{243EF8A7-F534-4440-8C5C-A61C86D65859}"/>
+                <a16:creationId xmlns="" xmlns:a16="http://schemas.microsoft.com/office/drawing/2014/main" id="{243EF8A7-F534-4440-8C5C-A61C86D65859}"/>
               </a:ext>
             </a:extLst>
           </p:cNvPr>
@@ -6836,7 +7238,7 @@
           <p:cNvPr id="2" name="Date Placeholder 1">
             <a:extLst>
               <a:ext uri="{FF2B5EF4-FFF2-40B4-BE49-F238E27FC236}">
-                <a16:creationId xmlns:a16="http://schemas.microsoft.com/office/drawing/2014/main" xmlns="" id="{557D1C03-83FB-4A41-A673-D79050803B7D}"/>
+                <a16:creationId xmlns="" xmlns:a16="http://schemas.microsoft.com/office/drawing/2014/main" id="{557D1C03-83FB-4A41-A673-D79050803B7D}"/>
               </a:ext>
             </a:extLst>
           </p:cNvPr>
@@ -6866,7 +7268,7 @@
           <p:cNvPr id="3" name="Slide Number Placeholder 2">
             <a:extLst>
               <a:ext uri="{FF2B5EF4-FFF2-40B4-BE49-F238E27FC236}">
-                <a16:creationId xmlns:a16="http://schemas.microsoft.com/office/drawing/2014/main" xmlns="" id="{159E4775-580B-43B1-BD6F-CC56A677381D}"/>
+                <a16:creationId xmlns="" xmlns:a16="http://schemas.microsoft.com/office/drawing/2014/main" id="{159E4775-580B-43B1-BD6F-CC56A677381D}"/>
               </a:ext>
             </a:extLst>
           </p:cNvPr>
@@ -6894,7 +7296,7 @@
     </p:spTree>
     <p:extLst>
       <p:ext uri="{BB962C8B-B14F-4D97-AF65-F5344CB8AC3E}">
-        <p14:creationId xmlns:p14="http://schemas.microsoft.com/office/powerpoint/2010/main" xmlns="" val="1975427906"/>
+        <p14:creationId xmlns="" xmlns:p14="http://schemas.microsoft.com/office/powerpoint/2010/main" val="1975427906"/>
       </p:ext>
     </p:extLst>
   </p:cSld>
@@ -6991,7 +7393,7 @@
         </p:nvSpPr>
         <p:spPr>
           <a:xfrm>
-            <a:off x="838200" y="1260629"/>
+            <a:off x="846826" y="1260629"/>
             <a:ext cx="10515600" cy="4190260"/>
           </a:xfrm>
         </p:spPr>
@@ -7008,8 +7410,17 @@
             </a:pPr>
             <a:r>
               <a:rPr lang="en-US" dirty="0"/>
-              <a:t>Power system fault diagnosis is the process of analyzing historical fault data to detect and predict current  or future fault.</a:t>
-            </a:r>
+              <a:t>Power system fault diagnosis is the process of analyzing historical fault data </a:t>
+            </a:r>
+            <a:r>
+              <a:rPr lang="en-US" dirty="0" smtClean="0"/>
+              <a:t>for the detection and the classification of the current faults</a:t>
+            </a:r>
+            <a:r>
+              <a:rPr lang="en-US" dirty="0" smtClean="0"/>
+              <a:t>.</a:t>
+            </a:r>
+            <a:endParaRPr lang="en-US" dirty="0"/>
           </a:p>
           <a:p>
             <a:pPr>
@@ -7018,8 +7429,13 @@
             </a:pPr>
             <a:r>
               <a:rPr lang="en-US" dirty="0"/>
-              <a:t>The objective of our project is to find out the faults in the transmission line  and to  classify them using the neural networks.</a:t>
-            </a:r>
+              <a:t>The objective of </a:t>
+            </a:r>
+            <a:r>
+              <a:rPr lang="en-US" dirty="0" smtClean="0"/>
+              <a:t>our project is detection and the classification of the faults with the help of the artificial neural networks by using past data to train the neural network.</a:t>
+            </a:r>
+            <a:endParaRPr lang="en-US" dirty="0"/>
           </a:p>
           <a:p>
             <a:endParaRPr lang="en-US" dirty="0"/>
@@ -7089,7 +7505,7 @@
     </p:spTree>
     <p:extLst>
       <p:ext uri="{BB962C8B-B14F-4D97-AF65-F5344CB8AC3E}">
-        <p14:creationId xmlns:p14="http://schemas.microsoft.com/office/powerpoint/2010/main" xmlns="" val="2117165276"/>
+        <p14:creationId xmlns="" xmlns:p14="http://schemas.microsoft.com/office/powerpoint/2010/main" val="2117165276"/>
       </p:ext>
     </p:extLst>
   </p:cSld>
@@ -7128,7 +7544,7 @@
           <p:cNvPr id="2" name="TextBox 1">
             <a:extLst>
               <a:ext uri="{FF2B5EF4-FFF2-40B4-BE49-F238E27FC236}">
-                <a16:creationId xmlns:a16="http://schemas.microsoft.com/office/drawing/2014/main" xmlns="" id="{647B59D4-2B44-4776-860C-47B66B58FF3B}"/>
+                <a16:creationId xmlns="" xmlns:a16="http://schemas.microsoft.com/office/drawing/2014/main" id="{647B59D4-2B44-4776-860C-47B66B58FF3B}"/>
               </a:ext>
             </a:extLst>
           </p:cNvPr>
@@ -7168,7 +7584,7 @@
           <p:cNvPr id="4" name="Subtitle 3">
             <a:extLst>
               <a:ext uri="{FF2B5EF4-FFF2-40B4-BE49-F238E27FC236}">
-                <a16:creationId xmlns:a16="http://schemas.microsoft.com/office/drawing/2014/main" xmlns="" id="{5BAF7A38-E445-4B58-9796-4267284E645F}"/>
+                <a16:creationId xmlns="" xmlns:a16="http://schemas.microsoft.com/office/drawing/2014/main" id="{5BAF7A38-E445-4B58-9796-4267284E645F}"/>
               </a:ext>
             </a:extLst>
           </p:cNvPr>
@@ -7187,7 +7603,7 @@
         </p:spPr>
         <p:txBody>
           <a:bodyPr>
-            <a:normAutofit fontScale="92500" lnSpcReduction="10000"/>
+            <a:normAutofit fontScale="92500"/>
           </a:bodyPr>
           <a:lstStyle/>
           <a:p>
@@ -7199,8 +7615,8 @@
               <a:buChar char="Ø"/>
             </a:pPr>
             <a:r>
-              <a:rPr lang="en-IN" sz="2800" dirty="0"/>
-              <a:t>In recent years, artificial intelligence technologies are becoming  more and more popular due to its amazing features.</a:t>
+              <a:rPr lang="en-IN" sz="2800" dirty="0" smtClean="0"/>
+              <a:t>From past few decades we are very much depending on the electric power.</a:t>
             </a:r>
           </a:p>
           <a:p>
@@ -7212,8 +7628,8 @@
               <a:buChar char="Ø"/>
             </a:pPr>
             <a:r>
-              <a:rPr lang="en-US" sz="2800" dirty="0"/>
-              <a:t>Application of artificial intelligence techniques in the electric power industry which is currently undergoing extraordinary development.</a:t>
+              <a:rPr lang="en-IN" sz="2800" dirty="0" smtClean="0"/>
+              <a:t>Transmission lines are the bridges between generating station to distribution station. </a:t>
             </a:r>
           </a:p>
           <a:p>
@@ -7225,8 +7641,21 @@
               <a:buChar char="Ø"/>
             </a:pPr>
             <a:r>
-              <a:rPr lang="en-US" sz="2800" dirty="0"/>
-              <a:t>One of the most thrilling and potentially cost-effective recent developments in this field is increasing usage of artificial intelligence techniques viz neural network, genetic algorithm, fuzzy logic, and expert systems.</a:t>
+              <a:rPr lang="en-IN" sz="2800" dirty="0" smtClean="0"/>
+              <a:t>Transmission lines will undergo many types of faults as they are exposed to the open air.</a:t>
+            </a:r>
+          </a:p>
+          <a:p>
+            <a:pPr marL="342900" indent="-342900" algn="just">
+              <a:lnSpc>
+                <a:spcPct val="150000"/>
+              </a:lnSpc>
+              <a:buFont typeface="Wingdings" panose="05000000000000000000" pitchFamily="2" charset="2"/>
+              <a:buChar char="Ø"/>
+            </a:pPr>
+            <a:r>
+              <a:rPr lang="en-IN" sz="2800" dirty="0" smtClean="0"/>
+              <a:t>The fault detection and the classification in the transmission line is very much important. </a:t>
             </a:r>
             <a:endParaRPr lang="en-IN" sz="2800" dirty="0"/>
           </a:p>
@@ -7237,7 +7666,7 @@
           <p:cNvPr id="3" name="Date Placeholder 2">
             <a:extLst>
               <a:ext uri="{FF2B5EF4-FFF2-40B4-BE49-F238E27FC236}">
-                <a16:creationId xmlns:a16="http://schemas.microsoft.com/office/drawing/2014/main" xmlns="" id="{885E3CB4-25D1-4287-82D6-F9574CEE3BDF}"/>
+                <a16:creationId xmlns="" xmlns:a16="http://schemas.microsoft.com/office/drawing/2014/main" id="{885E3CB4-25D1-4287-82D6-F9574CEE3BDF}"/>
               </a:ext>
             </a:extLst>
           </p:cNvPr>
@@ -7267,7 +7696,7 @@
           <p:cNvPr id="5" name="Slide Number Placeholder 4">
             <a:extLst>
               <a:ext uri="{FF2B5EF4-FFF2-40B4-BE49-F238E27FC236}">
-                <a16:creationId xmlns:a16="http://schemas.microsoft.com/office/drawing/2014/main" xmlns="" id="{298F78CD-D8AB-4C18-8B69-D4483DA72939}"/>
+                <a16:creationId xmlns="" xmlns:a16="http://schemas.microsoft.com/office/drawing/2014/main" id="{298F78CD-D8AB-4C18-8B69-D4483DA72939}"/>
               </a:ext>
             </a:extLst>
           </p:cNvPr>
@@ -7295,13 +7724,20 @@
     </p:spTree>
     <p:extLst>
       <p:ext uri="{BB962C8B-B14F-4D97-AF65-F5344CB8AC3E}">
-        <p14:creationId xmlns:p14="http://schemas.microsoft.com/office/powerpoint/2010/main" xmlns="" val="991653462"/>
+        <p14:creationId xmlns="" xmlns:p14="http://schemas.microsoft.com/office/powerpoint/2010/main" val="991653462"/>
       </p:ext>
     </p:extLst>
   </p:cSld>
   <p:clrMapOvr>
     <a:masterClrMapping/>
   </p:clrMapOvr>
+  <p:timing>
+    <p:tnLst>
+      <p:par>
+        <p:cTn id="1" dur="indefinite" restart="never" nodeType="tmRoot"/>
+      </p:par>
+    </p:tnLst>
+  </p:timing>
 </p:sld>
 </file>
 
@@ -7347,8 +7783,8 @@
               <a:buChar char="Ø"/>
             </a:pPr>
             <a:r>
-              <a:rPr lang="en-US" dirty="0"/>
-              <a:t>The training mechanism of deep learning is layer-wise pre-training mechanism.</a:t>
+              <a:rPr lang="en-US" dirty="0" smtClean="0"/>
+              <a:t>In recent days lot of data is generating due to SCADA.</a:t>
             </a:r>
           </a:p>
           <a:p>
@@ -7357,9 +7793,29 @@
               <a:buChar char="Ø"/>
             </a:pPr>
             <a:r>
-              <a:rPr lang="en-US" dirty="0"/>
-              <a:t>Deep learning also has great learning ability so it focuses on the field of machine learning and artificial intelligence.</a:t>
-            </a:r>
+              <a:rPr lang="en-US" dirty="0" smtClean="0"/>
+              <a:t>By using th</a:t>
+            </a:r>
+            <a:r>
+              <a:rPr lang="en-US" dirty="0" smtClean="0"/>
+              <a:t>e deep neural networks we can classify the type of fault which is occurred in the transmission line.</a:t>
+            </a:r>
+          </a:p>
+          <a:p>
+            <a:pPr algn="just">
+              <a:buFont typeface="Wingdings" panose="05000000000000000000" pitchFamily="2" charset="2"/>
+              <a:buChar char="Ø"/>
+            </a:pPr>
+            <a:r>
+              <a:rPr lang="en-US" dirty="0" smtClean="0"/>
+              <a:t>But for that we need past data.</a:t>
+            </a:r>
+          </a:p>
+          <a:p>
+            <a:pPr algn="just">
+              <a:buNone/>
+            </a:pPr>
+            <a:endParaRPr lang="en-US" dirty="0"/>
           </a:p>
         </p:txBody>
       </p:sp>
@@ -7416,7 +7872,7 @@
           <p:cNvPr id="6" name="TextBox 5">
             <a:extLst>
               <a:ext uri="{FF2B5EF4-FFF2-40B4-BE49-F238E27FC236}">
-                <a16:creationId xmlns:a16="http://schemas.microsoft.com/office/drawing/2014/main" xmlns="" id="{627EDDBC-2D68-45D1-8FFC-C063F89D8F33}"/>
+                <a16:creationId xmlns="" xmlns:a16="http://schemas.microsoft.com/office/drawing/2014/main" id="{627EDDBC-2D68-45D1-8FFC-C063F89D8F33}"/>
               </a:ext>
             </a:extLst>
           </p:cNvPr>
@@ -7449,13 +7905,20 @@
     </p:spTree>
     <p:extLst>
       <p:ext uri="{BB962C8B-B14F-4D97-AF65-F5344CB8AC3E}">
-        <p14:creationId xmlns:p14="http://schemas.microsoft.com/office/powerpoint/2010/main" xmlns="" val="4136263389"/>
+        <p14:creationId xmlns="" xmlns:p14="http://schemas.microsoft.com/office/powerpoint/2010/main" val="4136263389"/>
       </p:ext>
     </p:extLst>
   </p:cSld>
   <p:clrMapOvr>
     <a:masterClrMapping/>
   </p:clrMapOvr>
+  <p:timing>
+    <p:tnLst>
+      <p:par>
+        <p:cTn id="1" dur="indefinite" restart="never" nodeType="tmRoot"/>
+      </p:par>
+    </p:tnLst>
+  </p:timing>
 </p:sld>
 </file>
 
@@ -7502,7 +7965,7 @@
             </a:pPr>
             <a:r>
               <a:rPr lang="en-US" dirty="0" smtClean="0"/>
-              <a:t>MATLAB</a:t>
+              <a:t>Here we using MATLAB for the generation of the training data for the deep neural network.</a:t>
             </a:r>
           </a:p>
           <a:p>
@@ -7512,7 +7975,15 @@
             </a:pPr>
             <a:r>
               <a:rPr lang="en-US" dirty="0" smtClean="0"/>
-              <a:t>Microsoft Excel</a:t>
+              <a:t>We are using Microsoft Excel with </a:t>
+            </a:r>
+            <a:r>
+              <a:rPr lang="en-US" dirty="0" err="1" smtClean="0"/>
+              <a:t>NeuroSolutions</a:t>
+            </a:r>
+            <a:r>
+              <a:rPr lang="en-US" dirty="0" smtClean="0"/>
+              <a:t> software for the training and the testing of the network.</a:t>
             </a:r>
           </a:p>
           <a:p>
@@ -7521,10 +7992,10 @@
               <a:buChar char="Ø"/>
             </a:pPr>
             <a:r>
-              <a:rPr lang="en-US" dirty="0" err="1" smtClean="0"/>
-              <a:t>NeuroSolutions</a:t>
-            </a:r>
-            <a:endParaRPr lang="en-US" dirty="0"/>
+              <a:rPr lang="en-US" dirty="0" smtClean="0"/>
+              <a:t>We are using Recurrent Neural Network for the classification of the shunt faults in the transmission line.</a:t>
+            </a:r>
+            <a:endParaRPr lang="en-US" dirty="0" smtClean="0"/>
           </a:p>
         </p:txBody>
       </p:sp>
@@ -7581,7 +8052,7 @@
           <p:cNvPr id="6" name="TextBox 5">
             <a:extLst>
               <a:ext uri="{FF2B5EF4-FFF2-40B4-BE49-F238E27FC236}">
-                <a16:creationId xmlns:a16="http://schemas.microsoft.com/office/drawing/2014/main" xmlns="" id="{74347C76-4F23-44C2-8A76-7BCB3209A5F3}"/>
+                <a16:creationId xmlns="" xmlns:a16="http://schemas.microsoft.com/office/drawing/2014/main" id="{74347C76-4F23-44C2-8A76-7BCB3209A5F3}"/>
               </a:ext>
             </a:extLst>
           </p:cNvPr>
@@ -7611,15 +8082,7 @@
                   <a:srgbClr val="FF0000"/>
                 </a:solidFill>
               </a:rPr>
-              <a:t>Components/</a:t>
-            </a:r>
-            <a:r>
-              <a:rPr lang="en-IN" sz="3200" b="1" u="sng" dirty="0" err="1" smtClean="0">
-                <a:solidFill>
-                  <a:srgbClr val="FF0000"/>
-                </a:solidFill>
-              </a:rPr>
-              <a:t>Softwares</a:t>
+              <a:t>Components</a:t>
             </a:r>
             <a:endParaRPr lang="en-IN" sz="3200" b="1" u="sng" dirty="0">
               <a:solidFill>
@@ -7629,16 +8092,125 @@
           </a:p>
         </p:txBody>
       </p:sp>
+      <p:pic>
+        <p:nvPicPr>
+          <p:cNvPr id="7" name="Picture 6" descr="matlab.jpg"/>
+          <p:cNvPicPr>
+            <a:picLocks noChangeAspect="1"/>
+          </p:cNvPicPr>
+          <p:nvPr/>
+        </p:nvPicPr>
+        <p:blipFill>
+          <a:blip r:embed="rId2"/>
+          <a:stretch>
+            <a:fillRect/>
+          </a:stretch>
+        </p:blipFill>
+        <p:spPr>
+          <a:xfrm>
+            <a:off x="1656200" y="3928685"/>
+            <a:ext cx="1805940" cy="1623060"/>
+          </a:xfrm>
+          <a:prstGeom prst="rect">
+            <a:avLst/>
+          </a:prstGeom>
+        </p:spPr>
+      </p:pic>
+      <p:pic>
+        <p:nvPicPr>
+          <p:cNvPr id="8" name="Picture 7" descr="NS logo.jpg"/>
+          <p:cNvPicPr>
+            <a:picLocks noChangeAspect="1"/>
+          </p:cNvPicPr>
+          <p:nvPr/>
+        </p:nvPicPr>
+        <p:blipFill>
+          <a:blip r:embed="rId3"/>
+          <a:stretch>
+            <a:fillRect/>
+          </a:stretch>
+        </p:blipFill>
+        <p:spPr>
+          <a:xfrm>
+            <a:off x="5052708" y="4086691"/>
+            <a:ext cx="2293620" cy="1272540"/>
+          </a:xfrm>
+          <a:prstGeom prst="rect">
+            <a:avLst/>
+          </a:prstGeom>
+        </p:spPr>
+      </p:pic>
+      <p:pic>
+        <p:nvPicPr>
+          <p:cNvPr id="10" name="Picture 9" descr="excel logo.png"/>
+          <p:cNvPicPr>
+            <a:picLocks noChangeAspect="1"/>
+          </p:cNvPicPr>
+          <p:nvPr/>
+        </p:nvPicPr>
+        <p:blipFill>
+          <a:blip r:embed="rId4"/>
+          <a:stretch>
+            <a:fillRect/>
+          </a:stretch>
+        </p:blipFill>
+        <p:spPr>
+          <a:xfrm>
+            <a:off x="8652295" y="3640272"/>
+            <a:ext cx="2287511" cy="2287511"/>
+          </a:xfrm>
+          <a:prstGeom prst="rect">
+            <a:avLst/>
+          </a:prstGeom>
+        </p:spPr>
+      </p:pic>
+      <p:sp>
+        <p:nvSpPr>
+          <p:cNvPr id="11" name="TextBox 10"/>
+          <p:cNvSpPr txBox="1"/>
+          <p:nvPr/>
+        </p:nvSpPr>
+        <p:spPr>
+          <a:xfrm>
+            <a:off x="2044460" y="5822830"/>
+            <a:ext cx="1293963" cy="369332"/>
+          </a:xfrm>
+          <a:prstGeom prst="rect">
+            <a:avLst/>
+          </a:prstGeom>
+          <a:noFill/>
+        </p:spPr>
+        <p:txBody>
+          <a:bodyPr wrap="square" rtlCol="0">
+            <a:spAutoFit/>
+          </a:bodyPr>
+          <a:lstStyle/>
+          <a:p>
+            <a:r>
+              <a:rPr lang="en-US" dirty="0" err="1" smtClean="0"/>
+              <a:t>Matlab</a:t>
+            </a:r>
+            <a:endParaRPr lang="en-US" dirty="0"/>
+          </a:p>
+        </p:txBody>
+      </p:sp>
     </p:spTree>
     <p:extLst>
       <p:ext uri="{BB962C8B-B14F-4D97-AF65-F5344CB8AC3E}">
-        <p14:creationId xmlns:p14="http://schemas.microsoft.com/office/powerpoint/2010/main" xmlns="" val="1906710318"/>
+        <p14:creationId xmlns="" xmlns:p14="http://schemas.microsoft.com/office/powerpoint/2010/main" val="1906710318"/>
       </p:ext>
     </p:extLst>
   </p:cSld>
   <p:clrMapOvr>
     <a:masterClrMapping/>
   </p:clrMapOvr>
+  <p:timing>
+    <p:tnLst>
+      <p:par>
+        <p:cTn id="1" dur="indefinite" restart="never" nodeType="tmRoot"/>
+      </p:par>
+    </p:tnLst>
+  </p:timing>
 </p:sld>
 </file>
 
@@ -7659,43 +8231,29 @@
           <a:chExt cx="0" cy="0"/>
         </a:xfrm>
       </p:grpSpPr>
-      <p:sp>
-        <p:nvSpPr>
-          <p:cNvPr id="3" name="Content Placeholder 2"/>
-          <p:cNvSpPr>
-            <a:spLocks noGrp="1"/>
-          </p:cNvSpPr>
+      <p:pic>
+        <p:nvPicPr>
+          <p:cNvPr id="6" name="Content Placeholder 5" descr="RNN.jpeg"/>
+          <p:cNvPicPr>
+            <a:picLocks noGrp="1" noChangeAspect="1"/>
+          </p:cNvPicPr>
           <p:nvPr>
             <p:ph idx="1"/>
           </p:nvPr>
-        </p:nvSpPr>
+        </p:nvPicPr>
+        <p:blipFill>
+          <a:blip r:embed="rId2"/>
+          <a:stretch>
+            <a:fillRect/>
+          </a:stretch>
+        </p:blipFill>
         <p:spPr>
           <a:xfrm>
-            <a:off x="838200" y="1154097"/>
-            <a:ext cx="10515600" cy="5022866"/>
+            <a:off x="2444799" y="905773"/>
+            <a:ext cx="7216140" cy="4683500"/>
           </a:xfrm>
         </p:spPr>
-        <p:txBody>
-          <a:bodyPr/>
-          <a:lstStyle/>
-          <a:p>
-            <a:pPr algn="just">
-              <a:buFont typeface="Wingdings" panose="05000000000000000000" pitchFamily="2" charset="2"/>
-              <a:buChar char="Ø"/>
-            </a:pPr>
-            <a:r>
-              <a:rPr lang="en-US" dirty="0" smtClean="0"/>
-              <a:t>MATLAB</a:t>
-            </a:r>
-          </a:p>
-          <a:p>
-            <a:pPr algn="just">
-              <a:buNone/>
-            </a:pPr>
-            <a:endParaRPr lang="en-US" dirty="0" smtClean="0"/>
-          </a:p>
-        </p:txBody>
-      </p:sp>
+      </p:pic>
       <p:sp>
         <p:nvSpPr>
           <p:cNvPr id="4" name="Date Placeholder 3"/>
@@ -7744,61 +8302,18 @@
           </a:p>
         </p:txBody>
       </p:sp>
-      <p:sp>
-        <p:nvSpPr>
-          <p:cNvPr id="6" name="TextBox 5">
-            <a:extLst>
-              <a:ext uri="{FF2B5EF4-FFF2-40B4-BE49-F238E27FC236}">
-                <a16:creationId xmlns:a16="http://schemas.microsoft.com/office/drawing/2014/main" xmlns="" id="{74347C76-4F23-44C2-8A76-7BCB3209A5F3}"/>
-              </a:ext>
-            </a:extLst>
-          </p:cNvPr>
-          <p:cNvSpPr txBox="1"/>
-          <p:nvPr/>
-        </p:nvSpPr>
-        <p:spPr>
-          <a:xfrm>
-            <a:off x="838200" y="347987"/>
-            <a:ext cx="10622872" cy="584775"/>
-          </a:xfrm>
-          <a:prstGeom prst="rect">
-            <a:avLst/>
-          </a:prstGeom>
-          <a:noFill/>
-        </p:spPr>
-        <p:txBody>
-          <a:bodyPr wrap="square" rtlCol="0">
-            <a:spAutoFit/>
-          </a:bodyPr>
-          <a:lstStyle/>
-          <a:p>
-            <a:pPr algn="ctr"/>
-            <a:r>
-              <a:rPr lang="en-IN" sz="3200" b="1" u="sng" dirty="0" smtClean="0">
-                <a:solidFill>
-                  <a:srgbClr val="FF0000"/>
-                </a:solidFill>
-              </a:rPr>
-              <a:t>Simulation Results</a:t>
-            </a:r>
-            <a:endParaRPr lang="en-IN" sz="3200" b="1" u="sng" dirty="0">
-              <a:solidFill>
-                <a:srgbClr val="FF0000"/>
-              </a:solidFill>
-            </a:endParaRPr>
-          </a:p>
-        </p:txBody>
-      </p:sp>
     </p:spTree>
-    <p:extLst>
-      <p:ext uri="{BB962C8B-B14F-4D97-AF65-F5344CB8AC3E}">
-        <p14:creationId xmlns:p14="http://schemas.microsoft.com/office/powerpoint/2010/main" xmlns="" val="1906710318"/>
-      </p:ext>
-    </p:extLst>
   </p:cSld>
   <p:clrMapOvr>
     <a:masterClrMapping/>
   </p:clrMapOvr>
+  <p:timing>
+    <p:tnLst>
+      <p:par>
+        <p:cTn id="1" dur="indefinite" restart="never" nodeType="tmRoot"/>
+      </p:par>
+    </p:tnLst>
+  </p:timing>
 </p:sld>
 </file>
 
@@ -7831,28 +8346,148 @@
         </p:nvSpPr>
         <p:spPr>
           <a:xfrm>
-            <a:off x="838200" y="1154097"/>
-            <a:ext cx="10515600" cy="5022866"/>
+            <a:off x="6952890" y="1362973"/>
+            <a:ext cx="4409536" cy="4822616"/>
           </a:xfrm>
         </p:spPr>
         <p:txBody>
           <a:bodyPr/>
           <a:lstStyle/>
           <a:p>
-            <a:pPr algn="just">
-              <a:buFont typeface="Wingdings" panose="05000000000000000000" pitchFamily="2" charset="2"/>
-              <a:buChar char="Ø"/>
-            </a:pPr>
-            <a:r>
-              <a:rPr lang="en-US" dirty="0" smtClean="0"/>
-              <a:t>MATLAB</a:t>
-            </a:r>
-          </a:p>
-          <a:p>
-            <a:pPr algn="just">
+            <a:pPr>
               <a:buNone/>
             </a:pPr>
-            <a:endParaRPr lang="en-US" dirty="0" smtClean="0"/>
+            <a:r>
+              <a:rPr lang="en-US" dirty="0" smtClean="0"/>
+              <a:t>Line Voltage V</a:t>
+            </a:r>
+            <a:r>
+              <a:rPr lang="en-US" sz="1400" dirty="0" smtClean="0"/>
+              <a:t>L-L  </a:t>
+            </a:r>
+            <a:r>
+              <a:rPr lang="en-US" dirty="0" smtClean="0"/>
+              <a:t>= 220 kV</a:t>
+            </a:r>
+          </a:p>
+          <a:p>
+            <a:pPr>
+              <a:buNone/>
+            </a:pPr>
+            <a:r>
+              <a:rPr lang="en-US" dirty="0" smtClean="0"/>
+              <a:t>Line Length = 200 km</a:t>
+            </a:r>
+          </a:p>
+          <a:p>
+            <a:pPr>
+              <a:buNone/>
+            </a:pPr>
+            <a:r>
+              <a:rPr lang="en-US" dirty="0" smtClean="0"/>
+              <a:t>Frequency f = 50 Hz</a:t>
+            </a:r>
+          </a:p>
+          <a:p>
+            <a:pPr>
+              <a:buNone/>
+            </a:pPr>
+            <a:r>
+              <a:rPr lang="en-US" dirty="0" smtClean="0"/>
+              <a:t>Z</a:t>
+            </a:r>
+            <a:r>
+              <a:rPr lang="en-US" sz="1800" dirty="0" smtClean="0"/>
+              <a:t>1 </a:t>
+            </a:r>
+            <a:r>
+              <a:rPr lang="en-US" dirty="0" smtClean="0"/>
+              <a:t>= 4.76 + j*59.75 ohms</a:t>
+            </a:r>
+          </a:p>
+          <a:p>
+            <a:pPr>
+              <a:buNone/>
+            </a:pPr>
+            <a:r>
+              <a:rPr lang="en-US" dirty="0" smtClean="0"/>
+              <a:t>Z</a:t>
+            </a:r>
+            <a:r>
+              <a:rPr lang="en-US" sz="1600" dirty="0" smtClean="0"/>
+              <a:t>0 </a:t>
+            </a:r>
+            <a:r>
+              <a:rPr lang="en-US" dirty="0" smtClean="0"/>
+              <a:t>= 77.70 + j*204.26 ohms</a:t>
+            </a:r>
+          </a:p>
+          <a:p>
+            <a:pPr>
+              <a:buNone/>
+            </a:pPr>
+            <a:r>
+              <a:rPr lang="en-US" dirty="0" smtClean="0"/>
+              <a:t>Fault Types : </a:t>
+            </a:r>
+            <a:r>
+              <a:rPr lang="en-US" sz="1800" dirty="0" smtClean="0"/>
+              <a:t>a-g, b-g, c-g, </a:t>
+            </a:r>
+            <a:r>
+              <a:rPr lang="en-US" sz="1800" dirty="0" err="1" smtClean="0"/>
+              <a:t>ab</a:t>
+            </a:r>
+            <a:r>
+              <a:rPr lang="en-US" sz="1800" dirty="0" smtClean="0"/>
+              <a:t>, </a:t>
+            </a:r>
+            <a:r>
+              <a:rPr lang="en-US" sz="1800" dirty="0" err="1" smtClean="0"/>
+              <a:t>bc</a:t>
+            </a:r>
+            <a:r>
+              <a:rPr lang="en-US" sz="1800" dirty="0" smtClean="0"/>
+              <a:t>, ac, 		</a:t>
+            </a:r>
+            <a:r>
+              <a:rPr lang="en-US" sz="1800" dirty="0" err="1" smtClean="0"/>
+              <a:t>ab</a:t>
+            </a:r>
+            <a:r>
+              <a:rPr lang="en-US" sz="1800" dirty="0" smtClean="0"/>
+              <a:t>-g, </a:t>
+            </a:r>
+            <a:r>
+              <a:rPr lang="en-US" sz="1800" dirty="0" err="1" smtClean="0"/>
+              <a:t>bc</a:t>
+            </a:r>
+            <a:r>
+              <a:rPr lang="en-US" sz="1800" dirty="0" smtClean="0"/>
+              <a:t>-g, ac-g, </a:t>
+            </a:r>
+            <a:r>
+              <a:rPr lang="en-US" sz="1800" dirty="0" err="1" smtClean="0"/>
+              <a:t>abc</a:t>
+            </a:r>
+            <a:r>
+              <a:rPr lang="en-US" sz="1800" dirty="0" smtClean="0"/>
+              <a:t>, </a:t>
+            </a:r>
+          </a:p>
+          <a:p>
+            <a:pPr>
+              <a:buNone/>
+            </a:pPr>
+            <a:r>
+              <a:rPr lang="en-US" sz="1800" dirty="0" smtClean="0"/>
+              <a:t>	</a:t>
+            </a:r>
+            <a:r>
+              <a:rPr lang="en-US" sz="1800" dirty="0" smtClean="0"/>
+              <a:t>		no fault</a:t>
+            </a:r>
+            <a:endParaRPr lang="en-US" dirty="0"/>
           </a:p>
         </p:txBody>
       </p:sp>
@@ -7904,22 +8539,40 @@
           </a:p>
         </p:txBody>
       </p:sp>
-      <p:sp>
-        <p:nvSpPr>
-          <p:cNvPr id="6" name="TextBox 5">
-            <a:extLst>
-              <a:ext uri="{FF2B5EF4-FFF2-40B4-BE49-F238E27FC236}">
-                <a16:creationId xmlns:a16="http://schemas.microsoft.com/office/drawing/2014/main" xmlns="" id="{74347C76-4F23-44C2-8A76-7BCB3209A5F3}"/>
-              </a:ext>
-            </a:extLst>
-          </p:cNvPr>
+      <p:pic>
+        <p:nvPicPr>
+          <p:cNvPr id="7" name="Picture 6" descr="Capture.PNG"/>
+          <p:cNvPicPr>
+            <a:picLocks noChangeAspect="1"/>
+          </p:cNvPicPr>
+          <p:nvPr/>
+        </p:nvPicPr>
+        <p:blipFill>
+          <a:blip r:embed="rId2"/>
+          <a:stretch>
+            <a:fillRect/>
+          </a:stretch>
+        </p:blipFill>
+        <p:spPr>
+          <a:xfrm>
+            <a:off x="1117142" y="1884876"/>
+            <a:ext cx="5275032" cy="1242168"/>
+          </a:xfrm>
+          <a:prstGeom prst="rect">
+            <a:avLst/>
+          </a:prstGeom>
+        </p:spPr>
+      </p:pic>
+      <p:sp>
+        <p:nvSpPr>
+          <p:cNvPr id="9" name="TextBox 8"/>
           <p:cNvSpPr txBox="1"/>
           <p:nvPr/>
         </p:nvSpPr>
         <p:spPr>
           <a:xfrm>
-            <a:off x="838200" y="347987"/>
-            <a:ext cx="10622872" cy="584775"/>
+            <a:off x="1242204" y="3191762"/>
+            <a:ext cx="5129289" cy="369332"/>
           </a:xfrm>
           <a:prstGeom prst="rect">
             <a:avLst/>
@@ -7927,38 +8580,31 @@
           <a:noFill/>
         </p:spPr>
         <p:txBody>
-          <a:bodyPr wrap="square" rtlCol="0">
+          <a:bodyPr wrap="none" rtlCol="0">
             <a:spAutoFit/>
           </a:bodyPr>
           <a:lstStyle/>
           <a:p>
-            <a:pPr algn="ctr"/>
-            <a:r>
-              <a:rPr lang="en-IN" sz="3200" b="1" u="sng" dirty="0" smtClean="0">
-                <a:solidFill>
-                  <a:srgbClr val="FF0000"/>
-                </a:solidFill>
-              </a:rPr>
-              <a:t>Road Map</a:t>
-            </a:r>
-            <a:endParaRPr lang="en-IN" sz="3200" b="1" u="sng" dirty="0">
-              <a:solidFill>
-                <a:srgbClr val="FF0000"/>
-              </a:solidFill>
-            </a:endParaRPr>
+            <a:r>
+              <a:rPr lang="en-US" dirty="0" smtClean="0"/>
+              <a:t>Transmission network considered for the simulations</a:t>
+            </a:r>
+            <a:endParaRPr lang="en-US" dirty="0"/>
           </a:p>
         </p:txBody>
       </p:sp>
     </p:spTree>
-    <p:extLst>
-      <p:ext uri="{BB962C8B-B14F-4D97-AF65-F5344CB8AC3E}">
-        <p14:creationId xmlns:p14="http://schemas.microsoft.com/office/powerpoint/2010/main" xmlns="" val="1906710318"/>
-      </p:ext>
-    </p:extLst>
   </p:cSld>
   <p:clrMapOvr>
     <a:masterClrMapping/>
   </p:clrMapOvr>
+  <p:timing>
+    <p:tnLst>
+      <p:par>
+        <p:cTn id="1" dur="indefinite" restart="never" nodeType="tmRoot"/>
+      </p:par>
+    </p:tnLst>
+  </p:timing>
 </p:sld>
 </file>
 
@@ -8000,40 +8646,9 @@
           <a:lstStyle/>
           <a:p>
             <a:pPr algn="just">
-              <a:buFont typeface="Wingdings" panose="05000000000000000000" pitchFamily="2" charset="2"/>
-              <a:buChar char="Ø"/>
+              <a:buNone/>
             </a:pPr>
-            <a:r>
-              <a:rPr lang="en-US" dirty="0"/>
-              <a:t>The faults in the power system will play a major role in the system stability</a:t>
-            </a:r>
-          </a:p>
-          <a:p>
-            <a:pPr algn="just">
-              <a:buFont typeface="Wingdings" panose="05000000000000000000" pitchFamily="2" charset="2"/>
-              <a:buChar char="Ø"/>
-            </a:pPr>
-            <a:r>
-              <a:rPr lang="en-US" dirty="0"/>
-              <a:t>Fault classification is important for the operation of the healthy phases.</a:t>
-            </a:r>
-          </a:p>
-          <a:p>
-            <a:pPr algn="just">
-              <a:buFont typeface="Wingdings" panose="05000000000000000000" pitchFamily="2" charset="2"/>
-              <a:buChar char="Ø"/>
-            </a:pPr>
-            <a:r>
-              <a:rPr lang="en-US" dirty="0"/>
-              <a:t>Power system reliability gets improved.</a:t>
-            </a:r>
-          </a:p>
-          <a:p>
-            <a:pPr algn="just">
-              <a:buFont typeface="Wingdings" panose="05000000000000000000" pitchFamily="2" charset="2"/>
-              <a:buChar char="Ø"/>
-            </a:pPr>
-            <a:endParaRPr lang="en-US" dirty="0"/>
+            <a:endParaRPr lang="en-US" dirty="0" smtClean="0"/>
           </a:p>
         </p:txBody>
       </p:sp>
@@ -8090,7 +8705,7 @@
           <p:cNvPr id="6" name="TextBox 5">
             <a:extLst>
               <a:ext uri="{FF2B5EF4-FFF2-40B4-BE49-F238E27FC236}">
-                <a16:creationId xmlns:a16="http://schemas.microsoft.com/office/drawing/2014/main" xmlns="" id="{74347C76-4F23-44C2-8A76-7BCB3209A5F3}"/>
+                <a16:creationId xmlns="" xmlns:a16="http://schemas.microsoft.com/office/drawing/2014/main" id="{74347C76-4F23-44C2-8A76-7BCB3209A5F3}"/>
               </a:ext>
             </a:extLst>
           </p:cNvPr>
@@ -8115,26 +8730,46 @@
           <a:p>
             <a:pPr algn="ctr"/>
             <a:r>
-              <a:rPr lang="en-IN" sz="3200" b="1" u="sng">
+              <a:rPr lang="en-IN" sz="3200" b="1" u="sng" dirty="0" err="1" smtClean="0">
                 <a:solidFill>
                   <a:srgbClr val="FF0000"/>
                 </a:solidFill>
               </a:rPr>
-              <a:t>Applications</a:t>
-            </a:r>
+              <a:t>Simulationn</a:t>
+            </a:r>
+            <a:r>
+              <a:rPr lang="en-IN" sz="3200" b="1" u="sng" dirty="0" smtClean="0">
+                <a:solidFill>
+                  <a:srgbClr val="FF0000"/>
+                </a:solidFill>
+              </a:rPr>
+              <a:t> Results</a:t>
+            </a:r>
+            <a:endParaRPr lang="en-IN" sz="3200" b="1" u="sng" dirty="0">
+              <a:solidFill>
+                <a:srgbClr val="FF0000"/>
+              </a:solidFill>
+            </a:endParaRPr>
           </a:p>
         </p:txBody>
       </p:sp>
     </p:spTree>
     <p:extLst>
       <p:ext uri="{BB962C8B-B14F-4D97-AF65-F5344CB8AC3E}">
-        <p14:creationId xmlns:p14="http://schemas.microsoft.com/office/powerpoint/2010/main" xmlns="" val="1906710318"/>
+        <p14:creationId xmlns="" xmlns:p14="http://schemas.microsoft.com/office/powerpoint/2010/main" val="1906710318"/>
       </p:ext>
     </p:extLst>
   </p:cSld>
   <p:clrMapOvr>
     <a:masterClrMapping/>
   </p:clrMapOvr>
+  <p:timing>
+    <p:tnLst>
+      <p:par>
+        <p:cTn id="1" dur="indefinite" restart="never" nodeType="tmRoot"/>
+      </p:par>
+    </p:tnLst>
+  </p:timing>
 </p:sld>
 </file>
 
@@ -8393,7 +9028,7 @@
   <a:extraClrSchemeLst/>
   <a:extLst>
     <a:ext uri="{05A4C25C-085E-4340-85A3-A5531E510DB2}">
-      <thm15:themeFamily xmlns:thm15="http://schemas.microsoft.com/office/thememl/2012/main" xmlns="" name="Office Theme" id="{62F939B6-93AF-4DB8-9C6B-D6C7DFDC589F}" vid="{4A3C46E8-61CC-4603-A589-7422A47A8E4A}"/>
+      <thm15:themeFamily xmlns="" xmlns:thm15="http://schemas.microsoft.com/office/thememl/2012/main" name="Office Theme" id="{62F939B6-93AF-4DB8-9C6B-D6C7DFDC589F}" vid="{4A3C46E8-61CC-4603-A589-7422A47A8E4A}"/>
     </a:ext>
   </a:extLst>
 </a:theme>
@@ -8688,7 +9323,7 @@
   <a:extraClrSchemeLst/>
   <a:extLst>
     <a:ext uri="{05A4C25C-085E-4340-85A3-A5531E510DB2}">
-      <thm15:themeFamily xmlns:thm15="http://schemas.microsoft.com/office/thememl/2012/main" xmlns="" name="Office Theme" id="{62F939B6-93AF-4DB8-9C6B-D6C7DFDC589F}" vid="{4A3C46E8-61CC-4603-A589-7422A47A8E4A}"/>
+      <thm15:themeFamily xmlns="" xmlns:thm15="http://schemas.microsoft.com/office/thememl/2012/main" name="Office Theme" id="{62F939B6-93AF-4DB8-9C6B-D6C7DFDC589F}" vid="{4A3C46E8-61CC-4603-A589-7422A47A8E4A}"/>
     </a:ext>
   </a:extLst>
 </a:theme>

</xml_diff>